<commit_message>
Fixed typo in linear algebra tutorial slides
</commit_message>
<xml_diff>
--- a/website/tutorials/LinearAlgebra_Tutorial.pptx
+++ b/website/tutorials/LinearAlgebra_Tutorial.pptx
@@ -4961,8 +4961,8 @@
           </a:p>
         </p:txBody>
       </p:sp>
-      <mc:AlternateContent xmlns:mc="http://schemas.openxmlformats.org/markup-compatibility/2006">
-        <mc:Choice xmlns:a14="http://schemas.microsoft.com/office/drawing/2010/main" Requires="a14">
+      <mc:AlternateContent xmlns:mc="http://schemas.openxmlformats.org/markup-compatibility/2006" xmlns:a14="http://schemas.microsoft.com/office/drawing/2010/main">
+        <mc:Choice Requires="a14">
           <p:sp>
             <p:nvSpPr>
               <p:cNvPr id="6" name="TextShape 2">
@@ -5278,7 +5278,7 @@
             </p:txBody>
           </p:sp>
         </mc:Choice>
-        <mc:Fallback>
+        <mc:Fallback xmlns="">
           <p:sp>
             <p:nvSpPr>
               <p:cNvPr id="6" name="TextShape 2">
@@ -36597,7 +36597,7 @@
                 </a:solidFill>
                 <a:latin typeface="Noto Sans Regular"/>
               </a:rPr>
-              <a:t>Also frequency used</a:t>
+              <a:t>Also frequently used</a:t>
             </a:r>
             <a:r>
               <a:rPr lang="en-CA" sz="2400" spc="-1" dirty="0">
@@ -36679,8 +36679,8 @@
           </a:p>
         </p:txBody>
       </p:sp>
-      <mc:AlternateContent xmlns:mc="http://schemas.openxmlformats.org/markup-compatibility/2006" xmlns:a14="http://schemas.microsoft.com/office/drawing/2010/main">
-        <mc:Choice Requires="a14">
+      <mc:AlternateContent xmlns:mc="http://schemas.openxmlformats.org/markup-compatibility/2006">
+        <mc:Choice xmlns:a14="http://schemas.microsoft.com/office/drawing/2010/main" Requires="a14">
           <p:sp>
             <p:nvSpPr>
               <p:cNvPr id="3" name="TextBox 2">
@@ -36741,13 +36741,13 @@
                         </m:sub>
                         <m:sup>
                           <m:r>
-                            <a:rPr lang="en-CA" sz="2200" i="1" spc="-1">
+                            <a:rPr lang="en-CA" sz="2200" b="0" i="1" spc="-1" smtClean="0">
                               <a:solidFill>
                                 <a:srgbClr val="333333"/>
                               </a:solidFill>
                               <a:latin typeface="Cambria Math" panose="02040503050406030204" pitchFamily="18" charset="0"/>
                             </a:rPr>
-                            <m:t>𝑀</m:t>
+                            <m:t>𝑛</m:t>
                           </m:r>
                         </m:sup>
                         <m:e>
@@ -36980,7 +36980,7 @@
             </p:txBody>
           </p:sp>
         </mc:Choice>
-        <mc:Fallback xmlns="">
+        <mc:Fallback>
           <p:sp>
             <p:nvSpPr>
               <p:cNvPr id="3" name="TextBox 2">

</xml_diff>

<commit_message>
Fixed typos in linear algebra tutorial
</commit_message>
<xml_diff>
--- a/website/tutorials/LinearAlgebra_Tutorial.pptx
+++ b/website/tutorials/LinearAlgebra_Tutorial.pptx
@@ -5,7 +5,7 @@
     <p:sldMasterId id="2147483660" r:id="rId1"/>
   </p:sldMasterIdLst>
   <p:notesMasterIdLst>
-    <p:notesMasterId r:id="rId37"/>
+    <p:notesMasterId r:id="rId35"/>
   </p:notesMasterIdLst>
   <p:sldIdLst>
     <p:sldId id="256" r:id="rId2"/>
@@ -41,8 +41,6 @@
     <p:sldId id="272" r:id="rId32"/>
     <p:sldId id="294" r:id="rId33"/>
     <p:sldId id="296" r:id="rId34"/>
-    <p:sldId id="295" r:id="rId35"/>
-    <p:sldId id="258" r:id="rId36"/>
   </p:sldIdLst>
   <p:sldSz cx="9144000" cy="6858000" type="screen4x3"/>
   <p:notesSz cx="6858000" cy="9144000"/>
@@ -231,7 +229,7 @@
           <a:p>
             <a:fld id="{28AA768E-F8E0-43A4-9DAB-67199E11C532}" type="datetimeFigureOut">
               <a:rPr lang="en-CA" smtClean="0"/>
-              <a:t>2019-10-05</a:t>
+              <a:t>2021-06-28</a:t>
             </a:fld>
             <a:endParaRPr lang="en-CA"/>
           </a:p>
@@ -1052,7 +1050,7 @@
           <a:p>
             <a:fld id="{EEFF9937-7089-458F-8141-AF5369533E8C}" type="datetime1">
               <a:rPr lang="en-CA" smtClean="0"/>
-              <a:t>2019-10-05</a:t>
+              <a:t>2021-06-28</a:t>
             </a:fld>
             <a:endParaRPr lang="en-CA"/>
           </a:p>
@@ -1262,7 +1260,7 @@
           <a:p>
             <a:fld id="{0149DFB0-A796-4597-95AE-B1DFA5462110}" type="datetime1">
               <a:rPr lang="en-CA" smtClean="0"/>
-              <a:t>2019-10-05</a:t>
+              <a:t>2021-06-28</a:t>
             </a:fld>
             <a:endParaRPr lang="en-CA"/>
           </a:p>
@@ -1442,7 +1440,7 @@
           <a:p>
             <a:fld id="{4C8A52BB-DBA8-4D61-8E21-177EE8D83645}" type="datetime1">
               <a:rPr lang="en-CA" smtClean="0"/>
-              <a:t>2019-10-05</a:t>
+              <a:t>2021-06-28</a:t>
             </a:fld>
             <a:endParaRPr lang="en-CA"/>
           </a:p>
@@ -1641,7 +1639,7 @@
           <a:p>
             <a:fld id="{F9277689-7F2A-41B7-BD48-CFC305A89705}" type="datetime1">
               <a:rPr lang="en-CA" smtClean="0"/>
-              <a:t>2019-10-05</a:t>
+              <a:t>2021-06-28</a:t>
             </a:fld>
             <a:endParaRPr lang="en-CA"/>
           </a:p>
@@ -1925,7 +1923,7 @@
           <a:p>
             <a:fld id="{54A3B024-C2E2-47CF-BA55-3C4A2D1EA790}" type="datetime1">
               <a:rPr lang="en-CA" smtClean="0"/>
-              <a:t>2019-10-05</a:t>
+              <a:t>2021-06-28</a:t>
             </a:fld>
             <a:endParaRPr lang="en-CA"/>
           </a:p>
@@ -2157,7 +2155,7 @@
           <a:p>
             <a:fld id="{AE3DE944-2497-4CBA-8E94-B90292F4E9B5}" type="datetime1">
               <a:rPr lang="en-CA" smtClean="0"/>
-              <a:t>2019-10-05</a:t>
+              <a:t>2021-06-28</a:t>
             </a:fld>
             <a:endParaRPr lang="en-CA"/>
           </a:p>
@@ -2524,7 +2522,7 @@
           <a:p>
             <a:fld id="{CC53FE7D-C2D5-4606-BAA4-31F66E5E6457}" type="datetime1">
               <a:rPr lang="en-CA" smtClean="0"/>
-              <a:t>2019-10-05</a:t>
+              <a:t>2021-06-28</a:t>
             </a:fld>
             <a:endParaRPr lang="en-CA"/>
           </a:p>
@@ -2642,7 +2640,7 @@
           <a:p>
             <a:fld id="{C27D8D76-2661-49E1-854E-F03AEE801C96}" type="datetime1">
               <a:rPr lang="en-CA" smtClean="0"/>
-              <a:t>2019-10-05</a:t>
+              <a:t>2021-06-28</a:t>
             </a:fld>
             <a:endParaRPr lang="en-CA"/>
           </a:p>
@@ -2737,7 +2735,7 @@
           <a:p>
             <a:fld id="{5DD70825-C5DB-4B91-9FC6-B6BC627D3CD0}" type="datetime1">
               <a:rPr lang="en-CA" smtClean="0"/>
-              <a:t>2019-10-05</a:t>
+              <a:t>2021-06-28</a:t>
             </a:fld>
             <a:endParaRPr lang="en-CA"/>
           </a:p>
@@ -3014,7 +3012,7 @@
           <a:p>
             <a:fld id="{7A5181B9-69C9-4274-96FB-A775CDA9B197}" type="datetime1">
               <a:rPr lang="en-CA" smtClean="0"/>
-              <a:t>2019-10-05</a:t>
+              <a:t>2021-06-28</a:t>
             </a:fld>
             <a:endParaRPr lang="en-CA"/>
           </a:p>
@@ -3271,7 +3269,7 @@
           <a:p>
             <a:fld id="{7B7AB907-29CB-4B22-9220-E49B995347BC}" type="datetime1">
               <a:rPr lang="en-CA" smtClean="0"/>
-              <a:t>2019-10-05</a:t>
+              <a:t>2021-06-28</a:t>
             </a:fld>
             <a:endParaRPr lang="en-CA"/>
           </a:p>
@@ -3482,7 +3480,7 @@
           <a:p>
             <a:fld id="{B4580F54-E6A9-4C9F-A734-C5DBF20B3885}" type="datetime1">
               <a:rPr lang="en-CA" smtClean="0"/>
-              <a:t>2019-10-05</a:t>
+              <a:t>2021-06-28</a:t>
             </a:fld>
             <a:endParaRPr lang="en-CA"/>
           </a:p>
@@ -16921,16 +16919,7 @@
                 </a:solidFill>
                 <a:latin typeface="Noto Sans Regular"/>
               </a:rPr>
-              <a:t>relation to SVD and </a:t>
-            </a:r>
-            <a:r>
-              <a:rPr lang="en-CA" sz="2400" spc="-1" dirty="0" err="1">
-                <a:solidFill>
-                  <a:srgbClr val="333333"/>
-                </a:solidFill>
-                <a:latin typeface="Noto Sans Regular"/>
-              </a:rPr>
-              <a:t>eigendecomposition</a:t>
+              <a:t>relation to decomposition methods</a:t>
             </a:r>
             <a:endParaRPr lang="en-CA" sz="2400" b="0" strike="noStrike" spc="-1" dirty="0">
               <a:solidFill>
@@ -16938,28 +16927,6 @@
               </a:solidFill>
               <a:latin typeface="Noto Sans Regular"/>
             </a:endParaRPr>
-          </a:p>
-          <a:p>
-            <a:pPr marL="432000" indent="-324000">
-              <a:spcAft>
-                <a:spcPts val="1414"/>
-              </a:spcAft>
-              <a:buClr>
-                <a:srgbClr val="EF2929"/>
-              </a:buClr>
-              <a:buSzPct val="45000"/>
-              <a:buFont typeface="Wingdings" charset="2"/>
-              <a:buChar char=""/>
-            </a:pPr>
-            <a:r>
-              <a:rPr lang="en-CA" sz="2400" b="0" strike="noStrike" spc="-1" dirty="0">
-                <a:solidFill>
-                  <a:srgbClr val="333333"/>
-                </a:solidFill>
-                <a:latin typeface="Noto Sans Regular"/>
-              </a:rPr>
-              <a:t>Optional ROS coordinate transform exercise</a:t>
-            </a:r>
           </a:p>
         </p:txBody>
       </p:sp>
@@ -18106,8 +18073,8 @@
           </a:p>
         </p:txBody>
       </p:sp>
-      <mc:AlternateContent xmlns:mc="http://schemas.openxmlformats.org/markup-compatibility/2006" xmlns:a14="http://schemas.microsoft.com/office/drawing/2010/main">
-        <mc:Choice Requires="a14">
+      <mc:AlternateContent xmlns:mc="http://schemas.openxmlformats.org/markup-compatibility/2006">
+        <mc:Choice xmlns:a14="http://schemas.microsoft.com/office/drawing/2010/main" Requires="a14">
           <p:sp>
             <p:nvSpPr>
               <p:cNvPr id="2" name="Rectangle 1">
@@ -18123,7 +18090,7 @@
             <p:spPr>
               <a:xfrm>
                 <a:off x="200226" y="2509502"/>
-                <a:ext cx="8054834" cy="1112805"/>
+                <a:ext cx="8638070" cy="1112805"/>
               </a:xfrm>
               <a:prstGeom prst="rect">
                 <a:avLst/>
@@ -18145,6 +18112,68 @@
                     </m:r>
                     <m:r>
                       <a:rPr lang="en-CA" i="1" smtClean="0">
+                        <a:latin typeface="Cambria Math" panose="02040503050406030204" pitchFamily="18" charset="0"/>
+                      </a:rPr>
+                      <m:t>=</m:t>
+                    </m:r>
+                    <m:sSub>
+                      <m:sSubPr>
+                        <m:ctrlPr>
+                          <a:rPr lang="en-CA" b="1" i="1" smtClean="0">
+                            <a:latin typeface="Cambria Math" panose="02040503050406030204" pitchFamily="18" charset="0"/>
+                          </a:rPr>
+                        </m:ctrlPr>
+                      </m:sSubPr>
+                      <m:e>
+                        <m:r>
+                          <a:rPr lang="en-CA" b="1" i="1" smtClean="0">
+                            <a:latin typeface="Cambria Math" panose="02040503050406030204" pitchFamily="18" charset="0"/>
+                          </a:rPr>
+                          <m:t>𝑻</m:t>
+                        </m:r>
+                      </m:e>
+                      <m:sub>
+                        <m:r>
+                          <a:rPr lang="en-CA" b="1" i="1" smtClean="0">
+                            <a:latin typeface="Cambria Math" panose="02040503050406030204" pitchFamily="18" charset="0"/>
+                          </a:rPr>
+                          <m:t>𝟏</m:t>
+                        </m:r>
+                      </m:sub>
+                    </m:sSub>
+                    <m:r>
+                      <a:rPr lang="en-CA" b="1" i="1" smtClean="0">
+                        <a:latin typeface="Cambria Math" panose="02040503050406030204" pitchFamily="18" charset="0"/>
+                      </a:rPr>
+                      <m:t>𝑹</m:t>
+                    </m:r>
+                    <m:sSub>
+                      <m:sSubPr>
+                        <m:ctrlPr>
+                          <a:rPr lang="en-CA" b="1" i="1" smtClean="0">
+                            <a:latin typeface="Cambria Math" panose="02040503050406030204" pitchFamily="18" charset="0"/>
+                          </a:rPr>
+                        </m:ctrlPr>
+                      </m:sSubPr>
+                      <m:e>
+                        <m:r>
+                          <a:rPr lang="en-CA" b="1" i="1" smtClean="0">
+                            <a:latin typeface="Cambria Math" panose="02040503050406030204" pitchFamily="18" charset="0"/>
+                          </a:rPr>
+                          <m:t>𝑻</m:t>
+                        </m:r>
+                      </m:e>
+                      <m:sub>
+                        <m:r>
+                          <a:rPr lang="en-CA" b="1" i="1" smtClean="0">
+                            <a:latin typeface="Cambria Math" panose="02040503050406030204" pitchFamily="18" charset="0"/>
+                          </a:rPr>
+                          <m:t>𝟐</m:t>
+                        </m:r>
+                      </m:sub>
+                    </m:sSub>
+                    <m:r>
+                      <a:rPr lang="en-CA" b="0" i="1" smtClean="0">
                         <a:latin typeface="Cambria Math" panose="02040503050406030204" pitchFamily="18" charset="0"/>
                       </a:rPr>
                       <m:t>=</m:t>
@@ -18951,7 +18980,7 @@
             </p:txBody>
           </p:sp>
         </mc:Choice>
-        <mc:Fallback xmlns="">
+        <mc:Fallback>
           <p:sp>
             <p:nvSpPr>
               <p:cNvPr id="2" name="Rectangle 1">
@@ -18969,7 +18998,7 @@
             <p:spPr>
               <a:xfrm>
                 <a:off x="200226" y="2509502"/>
-                <a:ext cx="8054834" cy="1112805"/>
+                <a:ext cx="8638070" cy="1112805"/>
               </a:xfrm>
               <a:prstGeom prst="rect">
                 <a:avLst/>
@@ -19888,8 +19917,8 @@
           </a:p>
         </p:txBody>
       </p:sp>
-      <mc:AlternateContent xmlns:mc="http://schemas.openxmlformats.org/markup-compatibility/2006" xmlns:a14="http://schemas.microsoft.com/office/drawing/2010/main">
-        <mc:Choice Requires="a14">
+      <mc:AlternateContent xmlns:mc="http://schemas.openxmlformats.org/markup-compatibility/2006">
+        <mc:Choice xmlns:a14="http://schemas.microsoft.com/office/drawing/2010/main" Requires="a14">
           <p:sp>
             <p:nvSpPr>
               <p:cNvPr id="2" name="TextBox 1">
@@ -19968,7 +19997,15 @@
                                 <m:t>|</m:t>
                               </m:r>
                             </m:e>
-                            <m:e/>
+                            <m:e>
+                              <m:r>
+                                <a:rPr lang="en-CA" sz="2400" b="0" i="1" smtClean="0">
+                                  <a:latin typeface="Cambria Math" panose="02040503050406030204" pitchFamily="18" charset="0"/>
+                                  <a:ea typeface="Cambria Math" panose="02040503050406030204" pitchFamily="18" charset="0"/>
+                                </a:rPr>
+                                <m:t>…</m:t>
+                              </m:r>
+                            </m:e>
                             <m:e>
                               <m:r>
                                 <a:rPr lang="en-US" sz="2400" b="0" i="1" smtClean="0">
@@ -20106,7 +20143,15 @@
                                 <m:t>|</m:t>
                               </m:r>
                             </m:e>
-                            <m:e/>
+                            <m:e>
+                              <m:r>
+                                <a:rPr lang="en-CA" sz="2400" b="0" i="1" smtClean="0">
+                                  <a:latin typeface="Cambria Math" panose="02040503050406030204" pitchFamily="18" charset="0"/>
+                                  <a:ea typeface="Cambria Math" panose="02040503050406030204" pitchFamily="18" charset="0"/>
+                                </a:rPr>
+                                <m:t>…</m:t>
+                              </m:r>
+                            </m:e>
                             <m:e>
                               <m:r>
                                 <a:rPr lang="en-US" sz="2400" b="0" i="1" smtClean="0">
@@ -20182,7 +20227,15 @@
                                 <m:t>|</m:t>
                               </m:r>
                             </m:e>
-                            <m:e/>
+                            <m:e>
+                              <m:r>
+                                <a:rPr lang="en-CA" sz="2400" b="0" i="1" smtClean="0">
+                                  <a:latin typeface="Cambria Math" panose="02040503050406030204" pitchFamily="18" charset="0"/>
+                                  <a:ea typeface="Cambria Math" panose="02040503050406030204" pitchFamily="18" charset="0"/>
+                                </a:rPr>
+                                <m:t>…</m:t>
+                              </m:r>
+                            </m:e>
                             <m:e>
                               <m:r>
                                 <a:rPr lang="en-US" sz="2400" b="0" i="1" smtClean="0">
@@ -20302,7 +20355,15 @@
                                 <m:t>|</m:t>
                               </m:r>
                             </m:e>
-                            <m:e/>
+                            <m:e>
+                              <m:r>
+                                <a:rPr lang="en-CA" sz="2400" b="0" i="1" smtClean="0">
+                                  <a:latin typeface="Cambria Math" panose="02040503050406030204" pitchFamily="18" charset="0"/>
+                                  <a:ea typeface="Cambria Math" panose="02040503050406030204" pitchFamily="18" charset="0"/>
+                                </a:rPr>
+                                <m:t>…</m:t>
+                              </m:r>
+                            </m:e>
                             <m:e>
                               <m:r>
                                 <a:rPr lang="en-US" sz="2400" b="0" i="1" smtClean="0">
@@ -20323,7 +20384,7 @@
             </p:txBody>
           </p:sp>
         </mc:Choice>
-        <mc:Fallback xmlns="">
+        <mc:Fallback>
           <p:sp>
             <p:nvSpPr>
               <p:cNvPr id="2" name="TextBox 1">
@@ -20412,7 +20473,7 @@
         </p:nvSpPr>
         <p:spPr>
           <a:xfrm>
-            <a:off x="792000" y="3993480"/>
+            <a:off x="677700" y="3993480"/>
             <a:ext cx="8568000" cy="1661400"/>
           </a:xfrm>
           <a:prstGeom prst="rect">
@@ -22760,8 +22821,8 @@
           </a:p>
         </p:txBody>
       </p:sp>
-      <mc:AlternateContent xmlns:mc="http://schemas.openxmlformats.org/markup-compatibility/2006" xmlns:a14="http://schemas.microsoft.com/office/drawing/2010/main">
-        <mc:Choice Requires="a14">
+      <mc:AlternateContent xmlns:mc="http://schemas.openxmlformats.org/markup-compatibility/2006">
+        <mc:Choice xmlns:a14="http://schemas.microsoft.com/office/drawing/2010/main" Requires="a14">
           <p:sp>
             <p:nvSpPr>
               <p:cNvPr id="6" name="TextShape 2">
@@ -23052,6 +23113,82 @@
                     </m:r>
                   </m:oMath>
                 </a14:m>
+                <a:r>
+                  <a:rPr lang="en-CA" sz="2400" b="1" spc="-1" dirty="0">
+                    <a:solidFill>
+                      <a:srgbClr val="333333"/>
+                    </a:solidFill>
+                    <a:latin typeface="Noto Sans Regular"/>
+                  </a:rPr>
+                  <a:t> </a:t>
+                </a:r>
+                <a:r>
+                  <a:rPr lang="en-CA" sz="2400" spc="-1" dirty="0">
+                    <a:solidFill>
+                      <a:srgbClr val="333333"/>
+                    </a:solidFill>
+                    <a:latin typeface="Noto Sans Regular"/>
+                  </a:rPr>
+                  <a:t>where</a:t>
+                </a:r>
+                <a:r>
+                  <a:rPr lang="en-CA" sz="2400" b="1" spc="-1" dirty="0">
+                    <a:solidFill>
+                      <a:srgbClr val="333333"/>
+                    </a:solidFill>
+                    <a:latin typeface="Noto Sans Regular"/>
+                  </a:rPr>
+                  <a:t> </a:t>
+                </a:r>
+                <a14:m>
+                  <m:oMath xmlns:m="http://schemas.openxmlformats.org/officeDocument/2006/math">
+                    <m:r>
+                      <a:rPr lang="en-CA" sz="2400" b="1" i="1" spc="-1">
+                        <a:solidFill>
+                          <a:srgbClr val="333333"/>
+                        </a:solidFill>
+                        <a:latin typeface="Cambria Math" panose="02040503050406030204" pitchFamily="18" charset="0"/>
+                      </a:rPr>
+                      <m:t>𝒖</m:t>
+                    </m:r>
+                    <m:r>
+                      <a:rPr lang="en-CA" sz="2400" b="1" i="1" spc="-1">
+                        <a:solidFill>
+                          <a:srgbClr val="333333"/>
+                        </a:solidFill>
+                        <a:latin typeface="Cambria Math" panose="02040503050406030204" pitchFamily="18" charset="0"/>
+                      </a:rPr>
+                      <m:t>=</m:t>
+                    </m:r>
+                    <m:r>
+                      <a:rPr lang="en-CA" sz="2400" b="1" i="1" spc="-1">
+                        <a:solidFill>
+                          <a:srgbClr val="333333"/>
+                        </a:solidFill>
+                        <a:latin typeface="Cambria Math" panose="02040503050406030204" pitchFamily="18" charset="0"/>
+                      </a:rPr>
+                      <m:t>𝒚</m:t>
+                    </m:r>
+                    <m:r>
+                      <a:rPr lang="en-CA" sz="2400" i="1" spc="-1">
+                        <a:solidFill>
+                          <a:srgbClr val="333333"/>
+                        </a:solidFill>
+                        <a:latin typeface="Cambria Math" panose="02040503050406030204" pitchFamily="18" charset="0"/>
+                      </a:rPr>
+                      <m:t>−</m:t>
+                    </m:r>
+                    <m:r>
+                      <a:rPr lang="en-CA" sz="2400" b="1" i="1" spc="-1">
+                        <a:solidFill>
+                          <a:srgbClr val="333333"/>
+                        </a:solidFill>
+                        <a:latin typeface="Cambria Math" panose="02040503050406030204" pitchFamily="18" charset="0"/>
+                      </a:rPr>
+                      <m:t>𝑿𝒘</m:t>
+                    </m:r>
+                  </m:oMath>
+                </a14:m>
                 <a:endParaRPr lang="en-CA" sz="2400" b="1" spc="-1" dirty="0">
                   <a:solidFill>
                     <a:srgbClr val="333333"/>
@@ -23265,7 +23402,7 @@
             </p:txBody>
           </p:sp>
         </mc:Choice>
-        <mc:Fallback xmlns="">
+        <mc:Fallback>
           <p:sp>
             <p:nvSpPr>
               <p:cNvPr id="6" name="TextShape 2">
@@ -26919,7 +27056,7 @@
               <p:nvPr>
                 <p:extLst>
                   <p:ext uri="{D42A27DB-BD31-4B8C-83A1-F6EECF244321}">
-                    <p14:modId xmlns:p14="http://schemas.microsoft.com/office/powerpoint/2010/main" val="2330020032"/>
+                    <p14:modId xmlns:p14="http://schemas.microsoft.com/office/powerpoint/2010/main" val="4247696906"/>
                   </p:ext>
                 </p:extLst>
               </p:nvPr>
@@ -27063,7 +27200,7 @@
                           </a:pPr>
                           <a:r>
                             <a:rPr lang="en-CA" sz="2200" dirty="0"/>
-                            <a:t>Square root of eigenvalues of </a:t>
+                            <a:t>Positive square root of eigenvalues of </a:t>
                           </a:r>
                           <a14:m>
                             <m:oMath xmlns:m="http://schemas.openxmlformats.org/officeDocument/2006/math">
@@ -28021,7 +28158,7 @@
               <p:nvPr>
                 <p:extLst>
                   <p:ext uri="{D42A27DB-BD31-4B8C-83A1-F6EECF244321}">
-                    <p14:modId xmlns:p14="http://schemas.microsoft.com/office/powerpoint/2010/main" val="2330020032"/>
+                    <p14:modId xmlns:p14="http://schemas.microsoft.com/office/powerpoint/2010/main" val="4247696906"/>
                   </p:ext>
                 </p:extLst>
               </p:nvPr>
@@ -29412,7 +29549,7 @@
                     </a:solidFill>
                     <a:latin typeface="Noto Sans Regular"/>
                   </a:rPr>
-                  <a:t>Reasoning:</a:t>
+                  <a:t>Intuition:</a:t>
                 </a:r>
               </a:p>
               <a:p>
@@ -30289,7 +30426,7 @@
         </p:nvSpPr>
         <p:spPr>
           <a:xfrm>
-            <a:off x="720000" y="300960"/>
+            <a:off x="608240" y="240000"/>
             <a:ext cx="8855640" cy="1262520"/>
           </a:xfrm>
           <a:prstGeom prst="rect">
@@ -30311,7 +30448,18 @@
                 </a:solidFill>
                 <a:latin typeface="Noto Sans Regular"/>
               </a:rPr>
-              <a:t>Application: Pseudo-Inverse</a:t>
+              <a:t>Application: Pseudo-Inverse </a:t>
+            </a:r>
+          </a:p>
+          <a:p>
+            <a:r>
+              <a:rPr lang="en-CA" sz="4400" b="1" strike="noStrike" spc="-1" dirty="0">
+                <a:solidFill>
+                  <a:srgbClr val="333333"/>
+                </a:solidFill>
+                <a:latin typeface="Noto Sans Regular"/>
+              </a:rPr>
+              <a:t>and Least Squares Linear Regression</a:t>
             </a:r>
           </a:p>
         </p:txBody>
@@ -30365,7 +30513,7 @@
                     </a:solidFill>
                     <a:latin typeface="Noto Sans Regular"/>
                   </a:rPr>
-                  <a:t>If SVD decomposition is known, computation of pseudo-inverse is trivial </a:t>
+                  <a:t>If SVD decomposition is known, computation of left pseudo-inverse is trivial: </a:t>
                 </a:r>
               </a:p>
               <a:p>
@@ -30550,7 +30698,7 @@
                             </a:solidFill>
                             <a:latin typeface="Cambria Math" panose="02040503050406030204" pitchFamily="18" charset="0"/>
                           </a:rPr>
-                          <m:t>+</m:t>
+                          <m:t>−1</m:t>
                         </m:r>
                       </m:sup>
                     </m:sSup>
@@ -30614,10 +30762,56 @@
                     </a:solidFill>
                     <a:latin typeface="Noto Sans Regular"/>
                   </a:rPr>
-                  <a:t>(</a:t>
+                  <a:t>(since </a:t>
                 </a:r>
                 <a14:m>
                   <m:oMath xmlns:m="http://schemas.openxmlformats.org/officeDocument/2006/math">
+                    <m:sSup>
+                      <m:sSupPr>
+                        <m:ctrlPr>
+                          <a:rPr lang="en-CA" sz="2400" b="1" i="1" spc="-1" smtClean="0">
+                            <a:solidFill>
+                              <a:srgbClr val="FF0000"/>
+                            </a:solidFill>
+                            <a:latin typeface="Cambria Math" panose="02040503050406030204" pitchFamily="18" charset="0"/>
+                          </a:rPr>
+                        </m:ctrlPr>
+                      </m:sSupPr>
+                      <m:e>
+                        <m:r>
+                          <a:rPr lang="en-CA" sz="2400" b="1" i="0" spc="-1" smtClean="0">
+                            <a:solidFill>
+                              <a:srgbClr val="FF0000"/>
+                            </a:solidFill>
+                            <a:latin typeface="Cambria Math" panose="02040503050406030204" pitchFamily="18" charset="0"/>
+                          </a:rPr>
+                          <m:t>𝐀</m:t>
+                        </m:r>
+                      </m:e>
+                      <m:sup>
+                        <m:r>
+                          <a:rPr lang="en-CA" sz="2400" b="1" i="0" spc="-1" smtClean="0">
+                            <a:solidFill>
+                              <a:srgbClr val="FF0000"/>
+                            </a:solidFill>
+                            <a:latin typeface="Cambria Math" panose="02040503050406030204" pitchFamily="18" charset="0"/>
+                          </a:rPr>
+                          <m:t>+</m:t>
+                        </m:r>
+                      </m:sup>
+                    </m:sSup>
+                    <m:r>
+                      <m:rPr>
+                        <m:sty m:val="p"/>
+                      </m:rPr>
+                      <a:rPr lang="en-CA" sz="2400" b="0" i="0" spc="-1" smtClean="0">
+                        <a:solidFill>
+                          <a:srgbClr val="333333"/>
+                        </a:solidFill>
+                        <a:latin typeface="Cambria Math" panose="02040503050406030204" pitchFamily="18" charset="0"/>
+                      </a:rPr>
+                      <m:t>A</m:t>
+                    </m:r>
                     <m:r>
                       <a:rPr lang="en-CA" sz="2400" b="0" i="0" spc="-1" smtClean="0">
                         <a:solidFill>
@@ -30625,23 +30819,105 @@
                         </a:solidFill>
                         <a:latin typeface="Cambria Math" panose="02040503050406030204" pitchFamily="18" charset="0"/>
                       </a:rPr>
-                      <m:t>(</m:t>
-                    </m:r>
-                    <m:r>
-                      <a:rPr lang="en-CA" sz="2400" i="1" spc="-1">
-                        <a:solidFill>
-                          <a:srgbClr val="333333"/>
-                        </a:solidFill>
-                        <a:latin typeface="Cambria Math" panose="02040503050406030204" pitchFamily="18" charset="0"/>
-                      </a:rPr>
-                      <m:t>𝑉</m:t>
+                      <m:t>=</m:t>
                     </m:r>
                     <m:sSup>
                       <m:sSupPr>
                         <m:ctrlPr>
-                          <a:rPr lang="en-CA" sz="2400" i="1" spc="-1">
+                          <a:rPr lang="en-CA" sz="2400" b="1" i="1" spc="-1" smtClean="0">
                             <a:solidFill>
-                              <a:srgbClr val="333333"/>
+                              <a:srgbClr val="FF0000"/>
+                            </a:solidFill>
+                            <a:latin typeface="Cambria Math" panose="02040503050406030204" pitchFamily="18" charset="0"/>
+                          </a:rPr>
+                        </m:ctrlPr>
+                      </m:sSupPr>
+                      <m:e>
+                        <m:d>
+                          <m:dPr>
+                            <m:ctrlPr>
+                              <a:rPr lang="en-CA" sz="2400" b="1" i="1" spc="-1" smtClean="0">
+                                <a:solidFill>
+                                  <a:srgbClr val="FF0000"/>
+                                </a:solidFill>
+                                <a:latin typeface="Cambria Math" panose="02040503050406030204" pitchFamily="18" charset="0"/>
+                              </a:rPr>
+                            </m:ctrlPr>
+                          </m:dPr>
+                          <m:e>
+                            <m:sSup>
+                              <m:sSupPr>
+                                <m:ctrlPr>
+                                  <a:rPr lang="en-CA" sz="2400" b="1" i="1" spc="-1" smtClean="0">
+                                    <a:solidFill>
+                                      <a:srgbClr val="FF0000"/>
+                                    </a:solidFill>
+                                    <a:latin typeface="Cambria Math" panose="02040503050406030204" pitchFamily="18" charset="0"/>
+                                  </a:rPr>
+                                </m:ctrlPr>
+                              </m:sSupPr>
+                              <m:e>
+                                <m:r>
+                                  <a:rPr lang="en-CA" sz="2400" b="1" i="0" spc="-1" smtClean="0">
+                                    <a:solidFill>
+                                      <a:srgbClr val="FF0000"/>
+                                    </a:solidFill>
+                                    <a:latin typeface="Cambria Math" panose="02040503050406030204" pitchFamily="18" charset="0"/>
+                                  </a:rPr>
+                                  <m:t>𝐀</m:t>
+                                </m:r>
+                              </m:e>
+                              <m:sup>
+                                <m:r>
+                                  <a:rPr lang="en-CA" sz="2400" b="1" i="0" spc="-1" smtClean="0">
+                                    <a:solidFill>
+                                      <a:srgbClr val="FF0000"/>
+                                    </a:solidFill>
+                                    <a:latin typeface="Cambria Math" panose="02040503050406030204" pitchFamily="18" charset="0"/>
+                                  </a:rPr>
+                                  <m:t>𝐓</m:t>
+                                </m:r>
+                              </m:sup>
+                            </m:sSup>
+                            <m:r>
+                              <a:rPr lang="en-CA" sz="2400" b="1" i="0" spc="-1" smtClean="0">
+                                <a:solidFill>
+                                  <a:srgbClr val="FF0000"/>
+                                </a:solidFill>
+                                <a:latin typeface="Cambria Math" panose="02040503050406030204" pitchFamily="18" charset="0"/>
+                              </a:rPr>
+                              <m:t>𝐀</m:t>
+                            </m:r>
+                          </m:e>
+                        </m:d>
+                      </m:e>
+                      <m:sup>
+                        <m:r>
+                          <a:rPr lang="en-CA" sz="2400" b="1" i="0" spc="-1" smtClean="0">
+                            <a:solidFill>
+                              <a:srgbClr val="FF0000"/>
+                            </a:solidFill>
+                            <a:latin typeface="Cambria Math" panose="02040503050406030204" pitchFamily="18" charset="0"/>
+                          </a:rPr>
+                          <m:t>−</m:t>
+                        </m:r>
+                        <m:r>
+                          <a:rPr lang="en-CA" sz="2400" b="1" i="0" spc="-1" smtClean="0">
+                            <a:solidFill>
+                              <a:srgbClr val="FF0000"/>
+                            </a:solidFill>
+                            <a:latin typeface="Cambria Math" panose="02040503050406030204" pitchFamily="18" charset="0"/>
+                          </a:rPr>
+                          <m:t>𝟏</m:t>
+                        </m:r>
+                      </m:sup>
+                    </m:sSup>
+                    <m:sSup>
+                      <m:sSupPr>
+                        <m:ctrlPr>
+                          <a:rPr lang="en-CA" sz="2400" b="1" i="1" spc="-1" smtClean="0">
+                            <a:solidFill>
+                              <a:srgbClr val="FF0000"/>
                             </a:solidFill>
                             <a:latin typeface="Cambria Math" panose="02040503050406030204" pitchFamily="18" charset="0"/>
                           </a:rPr>
@@ -30649,36 +30925,63 @@
                       </m:sSupPr>
                       <m:e>
                         <m:r>
-                          <m:rPr>
-                            <m:sty m:val="p"/>
-                          </m:rPr>
-                          <a:rPr lang="en-CA" sz="2400" spc="-1">
+                          <a:rPr lang="en-CA" sz="2400" b="1" i="0" spc="-1" smtClean="0">
                             <a:solidFill>
-                              <a:srgbClr val="333333"/>
+                              <a:srgbClr val="FF0000"/>
                             </a:solidFill>
                             <a:latin typeface="Cambria Math" panose="02040503050406030204" pitchFamily="18" charset="0"/>
                           </a:rPr>
-                          <m:t>Σ</m:t>
+                          <m:t>𝐀</m:t>
                         </m:r>
                       </m:e>
                       <m:sup>
                         <m:r>
-                          <a:rPr lang="en-CA" sz="2400" spc="-1">
+                          <a:rPr lang="en-CA" sz="2400" b="1" i="0" spc="-1" smtClean="0">
                             <a:solidFill>
-                              <a:srgbClr val="333333"/>
+                              <a:srgbClr val="FF0000"/>
                             </a:solidFill>
                             <a:latin typeface="Cambria Math" panose="02040503050406030204" pitchFamily="18" charset="0"/>
                           </a:rPr>
-                          <m:t>+</m:t>
+                          <m:t>𝐓</m:t>
                         </m:r>
                       </m:sup>
                     </m:sSup>
+                    <m:r>
+                      <m:rPr>
+                        <m:sty m:val="p"/>
+                      </m:rPr>
+                      <a:rPr lang="en-CA" sz="2400" b="0" i="0" spc="-1" smtClean="0">
+                        <a:solidFill>
+                          <a:srgbClr val="333333"/>
+                        </a:solidFill>
+                        <a:latin typeface="Cambria Math" panose="02040503050406030204" pitchFamily="18" charset="0"/>
+                      </a:rPr>
+                      <m:t>A</m:t>
+                    </m:r>
+                    <m:r>
+                      <a:rPr lang="en-CA" sz="2400" b="0" i="0" spc="-1" smtClean="0">
+                        <a:solidFill>
+                          <a:srgbClr val="333333"/>
+                        </a:solidFill>
+                        <a:latin typeface="Cambria Math" panose="02040503050406030204" pitchFamily="18" charset="0"/>
+                      </a:rPr>
+                      <m:t>=(</m:t>
+                    </m:r>
+                    <m:r>
+                      <a:rPr lang="en-CA" sz="2400" b="1" i="1" spc="-1" smtClean="0">
+                        <a:solidFill>
+                          <a:srgbClr val="FF0000"/>
+                        </a:solidFill>
+                        <a:latin typeface="Cambria Math" panose="02040503050406030204" pitchFamily="18" charset="0"/>
+                      </a:rPr>
+                      <m:t>𝑽</m:t>
+                    </m:r>
                     <m:sSup>
                       <m:sSupPr>
                         <m:ctrlPr>
-                          <a:rPr lang="en-CA" sz="2400" i="1" spc="-1">
+                          <a:rPr lang="en-CA" sz="2400" b="1" i="1" spc="-1">
                             <a:solidFill>
-                              <a:srgbClr val="333333"/>
+                              <a:srgbClr val="FF0000"/>
                             </a:solidFill>
                             <a:latin typeface="Cambria Math" panose="02040503050406030204" pitchFamily="18" charset="0"/>
                           </a:rPr>
@@ -30686,30 +30989,67 @@
                       </m:sSupPr>
                       <m:e>
                         <m:r>
-                          <m:rPr>
-                            <m:sty m:val="p"/>
-                          </m:rPr>
-                          <a:rPr lang="en-CA" sz="2400" spc="-1">
+                          <a:rPr lang="en-CA" sz="2400" b="1" i="1" spc="-1">
                             <a:solidFill>
-                              <a:srgbClr val="333333"/>
+                              <a:srgbClr val="FF0000"/>
                             </a:solidFill>
                             <a:latin typeface="Cambria Math" panose="02040503050406030204" pitchFamily="18" charset="0"/>
                           </a:rPr>
-                          <m:t>U</m:t>
+                          <m:t>𝜮</m:t>
                         </m:r>
                       </m:e>
                       <m:sup>
                         <m:r>
-                          <m:rPr>
-                            <m:sty m:val="p"/>
-                          </m:rPr>
-                          <a:rPr lang="en-CA" sz="2400" spc="-1">
+                          <a:rPr lang="en-CA" sz="2400" b="1" i="0" spc="-1" smtClean="0">
                             <a:solidFill>
-                              <a:srgbClr val="333333"/>
+                              <a:srgbClr val="FF0000"/>
                             </a:solidFill>
                             <a:latin typeface="Cambria Math" panose="02040503050406030204" pitchFamily="18" charset="0"/>
                           </a:rPr>
-                          <m:t>T</m:t>
+                          <m:t>−</m:t>
+                        </m:r>
+                        <m:r>
+                          <a:rPr lang="en-CA" sz="2400" b="1" i="0" spc="-1" smtClean="0">
+                            <a:solidFill>
+                              <a:srgbClr val="FF0000"/>
+                            </a:solidFill>
+                            <a:latin typeface="Cambria Math" panose="02040503050406030204" pitchFamily="18" charset="0"/>
+                          </a:rPr>
+                          <m:t>𝟏</m:t>
+                        </m:r>
+                      </m:sup>
+                    </m:sSup>
+                    <m:sSup>
+                      <m:sSupPr>
+                        <m:ctrlPr>
+                          <a:rPr lang="en-CA" sz="2400" b="1" i="1" spc="-1">
+                            <a:solidFill>
+                              <a:srgbClr val="FF0000"/>
+                            </a:solidFill>
+                            <a:latin typeface="Cambria Math" panose="02040503050406030204" pitchFamily="18" charset="0"/>
+                          </a:rPr>
+                        </m:ctrlPr>
+                      </m:sSupPr>
+                      <m:e>
+                        <m:r>
+                          <a:rPr lang="en-CA" sz="2400" b="1" i="1" spc="-1">
+                            <a:solidFill>
+                              <a:srgbClr val="FF0000"/>
+                            </a:solidFill>
+                            <a:latin typeface="Cambria Math" panose="02040503050406030204" pitchFamily="18" charset="0"/>
+                          </a:rPr>
+                          <m:t>𝑼</m:t>
+                        </m:r>
+                      </m:e>
+                      <m:sup>
+                        <m:r>
+                          <a:rPr lang="en-CA" sz="2400" b="1" i="1" spc="-1">
+                            <a:solidFill>
+                              <a:srgbClr val="FF0000"/>
+                            </a:solidFill>
+                            <a:latin typeface="Cambria Math" panose="02040503050406030204" pitchFamily="18" charset="0"/>
+                          </a:rPr>
+                          <m:t>𝑻</m:t>
                         </m:r>
                       </m:sup>
                     </m:sSup>
@@ -30804,81 +31144,6 @@
                     </a:solidFill>
                     <a:latin typeface="Noto Sans Regular"/>
                   </a:rPr>
-                  <a:t> and </a:t>
-                </a:r>
-                <a14:m>
-                  <m:oMath xmlns:m="http://schemas.openxmlformats.org/officeDocument/2006/math">
-                    <m:sSup>
-                      <m:sSupPr>
-                        <m:ctrlPr>
-                          <a:rPr lang="en-CA" sz="2400" i="1" spc="-1">
-                            <a:solidFill>
-                              <a:srgbClr val="333333"/>
-                            </a:solidFill>
-                            <a:latin typeface="Cambria Math" panose="02040503050406030204" pitchFamily="18" charset="0"/>
-                          </a:rPr>
-                        </m:ctrlPr>
-                      </m:sSupPr>
-                      <m:e>
-                        <m:r>
-                          <m:rPr>
-                            <m:sty m:val="p"/>
-                          </m:rPr>
-                          <a:rPr lang="en-CA" sz="2400" spc="-1">
-                            <a:solidFill>
-                              <a:srgbClr val="333333"/>
-                            </a:solidFill>
-                            <a:latin typeface="Cambria Math" panose="02040503050406030204" pitchFamily="18" charset="0"/>
-                          </a:rPr>
-                          <m:t>Σ</m:t>
-                        </m:r>
-                      </m:e>
-                      <m:sup>
-                        <m:r>
-                          <a:rPr lang="en-CA" sz="2400" spc="-1">
-                            <a:solidFill>
-                              <a:srgbClr val="333333"/>
-                            </a:solidFill>
-                            <a:latin typeface="Cambria Math" panose="02040503050406030204" pitchFamily="18" charset="0"/>
-                          </a:rPr>
-                          <m:t>+</m:t>
-                        </m:r>
-                      </m:sup>
-                    </m:sSup>
-                  </m:oMath>
-                </a14:m>
-                <a:r>
-                  <a:rPr lang="en-CA" sz="2400" spc="-1" dirty="0">
-                    <a:solidFill>
-                      <a:srgbClr val="333333"/>
-                    </a:solidFill>
-                    <a:latin typeface="Noto Sans Regular"/>
-                  </a:rPr>
-                  <a:t> is reciprocal transpose of </a:t>
-                </a:r>
-                <a14:m>
-                  <m:oMath xmlns:m="http://schemas.openxmlformats.org/officeDocument/2006/math">
-                    <m:r>
-                      <m:rPr>
-                        <m:sty m:val="p"/>
-                      </m:rPr>
-                      <a:rPr lang="en-CA" sz="2400" b="0" i="0" spc="-1" smtClean="0">
-                        <a:solidFill>
-                          <a:srgbClr val="333333"/>
-                        </a:solidFill>
-                        <a:latin typeface="Cambria Math" panose="02040503050406030204" pitchFamily="18" charset="0"/>
-                      </a:rPr>
-                      <m:t>Σ</m:t>
-                    </m:r>
-                  </m:oMath>
-                </a14:m>
-                <a:r>
-                  <a:rPr lang="en-CA" sz="2400" spc="-1" dirty="0">
-                    <a:solidFill>
-                      <a:srgbClr val="333333"/>
-                    </a:solidFill>
-                    <a:latin typeface="Noto Sans Regular"/>
-                  </a:rPr>
                   <a:t>)</a:t>
                 </a:r>
               </a:p>
@@ -30901,7 +31166,25 @@
                     </a:solidFill>
                     <a:latin typeface="Noto Sans Regular"/>
                   </a:rPr>
-                  <a:t>Above pseudo-inverse can be used in place of left pseudo-inverse in Least Squares linear regression equation:</a:t>
+                  <a:t>Above can be used in place of left pseudo-inverse in </a:t>
+                </a:r>
+                <a:r>
+                  <a:rPr lang="en-CA" sz="2400" b="1" spc="-1" dirty="0">
+                    <a:solidFill>
+                      <a:srgbClr val="333333"/>
+                    </a:solidFill>
+                    <a:latin typeface="Noto Sans Regular"/>
+                  </a:rPr>
+                  <a:t>Least Squares linear regression </a:t>
+                </a:r>
+                <a:r>
+                  <a:rPr lang="en-CA" sz="2400" spc="-1" dirty="0">
+                    <a:solidFill>
+                      <a:srgbClr val="333333"/>
+                    </a:solidFill>
+                    <a:latin typeface="Noto Sans Regular"/>
+                  </a:rPr>
+                  <a:t>equation:</a:t>
                 </a:r>
               </a:p>
               <a:p>
@@ -30941,9 +31224,9 @@
                       <m:sSup>
                         <m:sSupPr>
                           <m:ctrlPr>
-                            <a:rPr lang="en-CA" sz="2400" i="1" spc="-1">
+                            <a:rPr lang="en-CA" sz="2400" i="1" spc="-1" smtClean="0">
                               <a:solidFill>
-                                <a:srgbClr val="FF0000"/>
+                                <a:schemeClr val="accent6"/>
                               </a:solidFill>
                               <a:latin typeface="Cambria Math" panose="02040503050406030204" pitchFamily="18" charset="0"/>
                             </a:rPr>
@@ -30955,7 +31238,7 @@
                               <m:ctrlPr>
                                 <a:rPr lang="en-CA" sz="2400" i="1" spc="-1">
                                   <a:solidFill>
-                                    <a:srgbClr val="FF0000"/>
+                                    <a:schemeClr val="accent6"/>
                                   </a:solidFill>
                                   <a:latin typeface="Cambria Math" panose="02040503050406030204" pitchFamily="18" charset="0"/>
                                 </a:rPr>
@@ -30967,7 +31250,7 @@
                                   <m:ctrlPr>
                                     <a:rPr lang="en-CA" sz="2400" i="1" spc="-1">
                                       <a:solidFill>
-                                        <a:srgbClr val="FF0000"/>
+                                        <a:schemeClr val="accent6"/>
                                       </a:solidFill>
                                       <a:latin typeface="Cambria Math" panose="02040503050406030204" pitchFamily="18" charset="0"/>
                                     </a:rPr>
@@ -30977,7 +31260,7 @@
                                   <m:r>
                                     <a:rPr lang="en-CA" sz="2400" b="1" i="1" spc="-1">
                                       <a:solidFill>
-                                        <a:srgbClr val="FF0000"/>
+                                        <a:schemeClr val="accent6"/>
                                       </a:solidFill>
                                       <a:latin typeface="Cambria Math" panose="02040503050406030204" pitchFamily="18" charset="0"/>
                                     </a:rPr>
@@ -30988,7 +31271,7 @@
                                   <m:r>
                                     <a:rPr lang="en-CA" sz="2400" i="1" spc="-1">
                                       <a:solidFill>
-                                        <a:srgbClr val="FF0000"/>
+                                        <a:schemeClr val="accent6"/>
                                       </a:solidFill>
                                       <a:latin typeface="Cambria Math" panose="02040503050406030204" pitchFamily="18" charset="0"/>
                                     </a:rPr>
@@ -30999,7 +31282,7 @@
                               <m:r>
                                 <a:rPr lang="en-CA" sz="2400" b="1" i="1" spc="-1">
                                   <a:solidFill>
-                                    <a:srgbClr val="FF0000"/>
+                                    <a:schemeClr val="accent6"/>
                                   </a:solidFill>
                                   <a:latin typeface="Cambria Math" panose="02040503050406030204" pitchFamily="18" charset="0"/>
                                 </a:rPr>
@@ -31012,7 +31295,7 @@
                           <m:r>
                             <a:rPr lang="en-CA" sz="2400" i="1" spc="-1">
                               <a:solidFill>
-                                <a:srgbClr val="FF0000"/>
+                                <a:schemeClr val="accent6"/>
                               </a:solidFill>
                               <a:latin typeface="Cambria Math" panose="02040503050406030204" pitchFamily="18" charset="0"/>
                             </a:rPr>
@@ -31025,7 +31308,7 @@
                           <m:ctrlPr>
                             <a:rPr lang="en-CA" sz="2400" i="1" spc="-1">
                               <a:solidFill>
-                                <a:srgbClr val="FF0000"/>
+                                <a:schemeClr val="accent6"/>
                               </a:solidFill>
                               <a:latin typeface="Cambria Math" panose="02040503050406030204" pitchFamily="18" charset="0"/>
                             </a:rPr>
@@ -31035,7 +31318,7 @@
                           <m:r>
                             <a:rPr lang="en-CA" sz="2400" b="1" i="1" spc="-1">
                               <a:solidFill>
-                                <a:srgbClr val="FF0000"/>
+                                <a:schemeClr val="accent6"/>
                               </a:solidFill>
                               <a:latin typeface="Cambria Math" panose="02040503050406030204" pitchFamily="18" charset="0"/>
                             </a:rPr>
@@ -31046,7 +31329,7 @@
                           <m:r>
                             <a:rPr lang="en-CA" sz="2400" i="1" spc="-1">
                               <a:solidFill>
-                                <a:srgbClr val="FF0000"/>
+                                <a:schemeClr val="accent6"/>
                               </a:solidFill>
                               <a:latin typeface="Cambria Math" panose="02040503050406030204" pitchFamily="18" charset="0"/>
                             </a:rPr>
@@ -31064,13 +31347,13 @@
                         <m:t>𝒚</m:t>
                       </m:r>
                       <m:r>
-                        <a:rPr lang="en-CA" sz="2400" b="1" i="1" spc="-1">
+                        <a:rPr lang="en-CA" sz="2400" b="1" i="1" spc="-1" smtClean="0">
                           <a:solidFill>
                             <a:srgbClr val="333333"/>
                           </a:solidFill>
                           <a:latin typeface="Cambria Math" panose="02040503050406030204" pitchFamily="18" charset="0"/>
                         </a:rPr>
-                        <m:t>→</m:t>
+                        <m:t>=</m:t>
                       </m:r>
                       <m:r>
                         <a:rPr lang="en-CA" sz="2400" b="1" i="1" spc="-1">
@@ -31105,13 +31388,13 @@
                         </m:e>
                         <m:sup>
                           <m:r>
-                            <a:rPr lang="en-CA" sz="2400" spc="-1">
+                            <a:rPr lang="en-CA" sz="2400" b="0" i="0" spc="-1" smtClean="0">
                               <a:solidFill>
                                 <a:srgbClr val="00B050"/>
                               </a:solidFill>
                               <a:latin typeface="Cambria Math" panose="02040503050406030204" pitchFamily="18" charset="0"/>
                             </a:rPr>
-                            <m:t>+</m:t>
+                            <m:t>−1</m:t>
                           </m:r>
                         </m:sup>
                       </m:sSup>
@@ -31261,7 +31544,7 @@
               <a:blipFill>
                 <a:blip r:embed="rId3"/>
                 <a:stretch>
-                  <a:fillRect l="-705" t="-2125" r="-2821"/>
+                  <a:fillRect l="-705" t="-2125" b="-1992"/>
                 </a:stretch>
               </a:blipFill>
               <a:ln>
@@ -31283,1198 +31566,14 @@
           </p:sp>
         </mc:Fallback>
       </mc:AlternateContent>
-      <p:sp>
-        <p:nvSpPr>
-          <p:cNvPr id="3" name="Rectangle 2">
-            <a:extLst>
-              <a:ext uri="{FF2B5EF4-FFF2-40B4-BE49-F238E27FC236}">
-                <a16:creationId xmlns:a16="http://schemas.microsoft.com/office/drawing/2014/main" id="{EF571DAB-CAAC-4CB5-B2F3-95D18819EDA3}"/>
-              </a:ext>
-            </a:extLst>
-          </p:cNvPr>
-          <p:cNvSpPr/>
-          <p:nvPr/>
-        </p:nvSpPr>
-        <p:spPr>
-          <a:xfrm>
-            <a:off x="2286000" y="5111830"/>
-            <a:ext cx="4572000" cy="430887"/>
-          </a:xfrm>
-          <a:prstGeom prst="rect">
-            <a:avLst/>
-          </a:prstGeom>
-        </p:spPr>
-        <p:txBody>
-          <a:bodyPr>
-            <a:spAutoFit/>
-          </a:bodyPr>
-          <a:lstStyle/>
-          <a:p>
-            <a:pPr marL="108000" algn="ctr">
-              <a:spcAft>
-                <a:spcPts val="1414"/>
-              </a:spcAft>
-              <a:buClr>
-                <a:srgbClr val="EF2929"/>
-              </a:buClr>
-              <a:buSzPct val="100000"/>
-            </a:pPr>
-            <a:r>
-              <a:rPr lang="en-CA" sz="2200" spc="-1" dirty="0">
-                <a:solidFill>
-                  <a:srgbClr val="333333"/>
-                </a:solidFill>
-                <a:latin typeface="Noto Sans Regular"/>
-              </a:rPr>
-              <a:t>(where X = A)</a:t>
-            </a:r>
-          </a:p>
-        </p:txBody>
-      </p:sp>
-    </p:spTree>
-    <p:extLst>
-      <p:ext uri="{BB962C8B-B14F-4D97-AF65-F5344CB8AC3E}">
-        <p14:creationId xmlns:p14="http://schemas.microsoft.com/office/powerpoint/2010/main" val="1136207239"/>
-      </p:ext>
-    </p:extLst>
-  </p:cSld>
-  <p:clrMapOvr>
-    <a:masterClrMapping/>
-  </p:clrMapOvr>
-</p:sld>
-</file>
-
-<file path=ppt/slides/slide34.xml><?xml version="1.0" encoding="utf-8"?>
-<p:sld xmlns:a="http://schemas.openxmlformats.org/drawingml/2006/main" xmlns:r="http://schemas.openxmlformats.org/officeDocument/2006/relationships" xmlns:p="http://schemas.openxmlformats.org/presentationml/2006/main">
-  <p:cSld>
-    <p:spTree>
-      <p:nvGrpSpPr>
-        <p:cNvPr id="1" name=""/>
-        <p:cNvGrpSpPr/>
-        <p:nvPr/>
-      </p:nvGrpSpPr>
-      <p:grpSpPr>
-        <a:xfrm>
-          <a:off x="0" y="0"/>
-          <a:ext cx="0" cy="0"/>
-          <a:chOff x="0" y="0"/>
-          <a:chExt cx="0" cy="0"/>
-        </a:xfrm>
-      </p:grpSpPr>
-      <p:sp>
-        <p:nvSpPr>
-          <p:cNvPr id="4" name="Slide Number Placeholder 3">
-            <a:extLst>
-              <a:ext uri="{FF2B5EF4-FFF2-40B4-BE49-F238E27FC236}">
-                <a16:creationId xmlns:a16="http://schemas.microsoft.com/office/drawing/2014/main" id="{BB42BA6F-63F1-47A7-9EC4-AEB3F8AEE033}"/>
-              </a:ext>
-            </a:extLst>
-          </p:cNvPr>
-          <p:cNvSpPr>
-            <a:spLocks noGrp="1"/>
-          </p:cNvSpPr>
-          <p:nvPr>
-            <p:ph type="sldNum" sz="quarter" idx="12"/>
-          </p:nvPr>
-        </p:nvSpPr>
-        <p:spPr/>
-        <p:txBody>
-          <a:bodyPr/>
-          <a:lstStyle/>
-          <a:p>
-            <a:fld id="{8F2D09F1-5447-4EA4-8EA6-0865537200C5}" type="slidenum">
-              <a:rPr lang="en-CA" smtClean="0"/>
-              <a:t>34</a:t>
-            </a:fld>
-            <a:endParaRPr lang="en-CA"/>
-          </a:p>
-        </p:txBody>
-      </p:sp>
-      <p:sp>
-        <p:nvSpPr>
-          <p:cNvPr id="5" name="TextShape 1">
-            <a:extLst>
-              <a:ext uri="{FF2B5EF4-FFF2-40B4-BE49-F238E27FC236}">
-                <a16:creationId xmlns:a16="http://schemas.microsoft.com/office/drawing/2014/main" id="{4E464BCD-5165-4EA8-A7C4-01702A446797}"/>
-              </a:ext>
-            </a:extLst>
-          </p:cNvPr>
-          <p:cNvSpPr txBox="1"/>
-          <p:nvPr/>
-        </p:nvSpPr>
-        <p:spPr>
-          <a:xfrm>
-            <a:off x="720000" y="300960"/>
-            <a:ext cx="8855640" cy="1262520"/>
-          </a:xfrm>
-          <a:prstGeom prst="rect">
-            <a:avLst/>
-          </a:prstGeom>
-          <a:noFill/>
-          <a:ln>
-            <a:noFill/>
-          </a:ln>
-        </p:spPr>
-        <p:txBody>
-          <a:bodyPr lIns="0" tIns="0" rIns="0" bIns="0" anchor="ctr"/>
-          <a:lstStyle/>
-          <a:p>
-            <a:r>
-              <a:rPr lang="en-CA" sz="4400" b="1" strike="noStrike" spc="-1" dirty="0">
-                <a:solidFill>
-                  <a:srgbClr val="333333"/>
-                </a:solidFill>
-                <a:latin typeface="Noto Sans Regular"/>
-              </a:rPr>
-              <a:t>SVD and </a:t>
-            </a:r>
-            <a:r>
-              <a:rPr lang="en-CA" sz="4400" b="1" strike="noStrike" spc="-1" dirty="0" err="1">
-                <a:solidFill>
-                  <a:srgbClr val="333333"/>
-                </a:solidFill>
-                <a:latin typeface="Noto Sans Regular"/>
-              </a:rPr>
-              <a:t>Eigendecomposition</a:t>
-            </a:r>
-            <a:r>
-              <a:rPr lang="en-CA" sz="4400" b="1" strike="noStrike" spc="-1" dirty="0">
-                <a:solidFill>
-                  <a:srgbClr val="333333"/>
-                </a:solidFill>
-                <a:latin typeface="Noto Sans Regular"/>
-              </a:rPr>
-              <a:t> Equivalency</a:t>
-            </a:r>
-          </a:p>
-        </p:txBody>
-      </p:sp>
       <mc:AlternateContent xmlns:mc="http://schemas.openxmlformats.org/markup-compatibility/2006" xmlns:a14="http://schemas.microsoft.com/office/drawing/2010/main">
         <mc:Choice Requires="a14">
           <p:sp>
             <p:nvSpPr>
-              <p:cNvPr id="6" name="TextShape 2">
+              <p:cNvPr id="3" name="Rectangle 2">
                 <a:extLst>
                   <a:ext uri="{FF2B5EF4-FFF2-40B4-BE49-F238E27FC236}">
-                    <a16:creationId xmlns:a16="http://schemas.microsoft.com/office/drawing/2014/main" id="{60BEF98C-8896-4CC1-BA48-04B35A72CF20}"/>
-                  </a:ext>
-                </a:extLst>
-              </p:cNvPr>
-              <p:cNvSpPr txBox="1"/>
-              <p:nvPr/>
-            </p:nvSpPr>
-            <p:spPr>
-              <a:xfrm>
-                <a:off x="252000" y="1767513"/>
-                <a:ext cx="8640000" cy="2804327"/>
-              </a:xfrm>
-              <a:prstGeom prst="rect">
-                <a:avLst/>
-              </a:prstGeom>
-              <a:noFill/>
-              <a:ln>
-                <a:noFill/>
-              </a:ln>
-            </p:spPr>
-            <p:txBody>
-              <a:bodyPr lIns="0" tIns="0" rIns="0" bIns="0"/>
-              <a:lstStyle/>
-              <a:p>
-                <a:pPr marL="108000">
-                  <a:spcAft>
-                    <a:spcPts val="800"/>
-                  </a:spcAft>
-                  <a:buClr>
-                    <a:srgbClr val="EF2929"/>
-                  </a:buClr>
-                  <a:buSzPct val="100000"/>
-                </a:pPr>
-                <a:r>
-                  <a:rPr lang="en-CA" sz="2400" b="1" spc="-1" dirty="0">
-                    <a:solidFill>
-                      <a:srgbClr val="333333"/>
-                    </a:solidFill>
-                    <a:latin typeface="Noto Sans Regular"/>
-                  </a:rPr>
-                  <a:t>Requirements on matrix </a:t>
-                </a:r>
-                <a14:m>
-                  <m:oMath xmlns:m="http://schemas.openxmlformats.org/officeDocument/2006/math">
-                    <m:r>
-                      <a:rPr lang="en-CA" sz="2400" b="1" i="1" spc="-1" smtClean="0">
-                        <a:solidFill>
-                          <a:srgbClr val="333333"/>
-                        </a:solidFill>
-                        <a:latin typeface="Cambria Math" panose="02040503050406030204" pitchFamily="18" charset="0"/>
-                      </a:rPr>
-                      <m:t>𝑨</m:t>
-                    </m:r>
-                  </m:oMath>
-                </a14:m>
-                <a:r>
-                  <a:rPr lang="en-CA" sz="2400" b="1" spc="-1" dirty="0">
-                    <a:solidFill>
-                      <a:srgbClr val="333333"/>
-                    </a:solidFill>
-                    <a:latin typeface="Noto Sans Regular"/>
-                  </a:rPr>
-                  <a:t>:</a:t>
-                </a:r>
-              </a:p>
-              <a:p>
-                <a:pPr marL="565200" indent="-457200">
-                  <a:spcAft>
-                    <a:spcPts val="800"/>
-                  </a:spcAft>
-                  <a:buClr>
-                    <a:srgbClr val="EF2929"/>
-                  </a:buClr>
-                  <a:buSzPct val="100000"/>
-                  <a:buFont typeface="Arial" panose="020B0604020202020204" pitchFamily="34" charset="0"/>
-                  <a:buChar char="•"/>
-                </a:pPr>
-                <a:r>
-                  <a:rPr lang="en-CA" sz="2400" spc="-1" dirty="0">
-                    <a:solidFill>
-                      <a:srgbClr val="333333"/>
-                    </a:solidFill>
-                    <a:latin typeface="Noto Sans Regular"/>
-                  </a:rPr>
-                  <a:t>Symmetric </a:t>
-                </a:r>
-                <a14:m>
-                  <m:oMath xmlns:m="http://schemas.openxmlformats.org/officeDocument/2006/math">
-                    <m:r>
-                      <a:rPr lang="en-CA" sz="2400" b="0" i="0" spc="-1" smtClean="0">
-                        <a:solidFill>
-                          <a:srgbClr val="333333"/>
-                        </a:solidFill>
-                        <a:latin typeface="Cambria Math" panose="02040503050406030204" pitchFamily="18" charset="0"/>
-                      </a:rPr>
-                      <m:t>(</m:t>
-                    </m:r>
-                    <m:sSup>
-                      <m:sSupPr>
-                        <m:ctrlPr>
-                          <a:rPr lang="en-CA" sz="2400" i="1" spc="-1">
-                            <a:solidFill>
-                              <a:srgbClr val="333333"/>
-                            </a:solidFill>
-                            <a:latin typeface="Cambria Math" panose="02040503050406030204" pitchFamily="18" charset="0"/>
-                          </a:rPr>
-                        </m:ctrlPr>
-                      </m:sSupPr>
-                      <m:e>
-                        <m:r>
-                          <a:rPr lang="en-CA" sz="2400" b="1" i="1" spc="-1">
-                            <a:solidFill>
-                              <a:srgbClr val="333333"/>
-                            </a:solidFill>
-                            <a:latin typeface="Cambria Math" panose="02040503050406030204" pitchFamily="18" charset="0"/>
-                          </a:rPr>
-                          <m:t>𝑨</m:t>
-                        </m:r>
-                      </m:e>
-                      <m:sup>
-                        <m:r>
-                          <a:rPr lang="en-CA" sz="2400" b="0" i="1" spc="-1">
-                            <a:solidFill>
-                              <a:srgbClr val="333333"/>
-                            </a:solidFill>
-                            <a:latin typeface="Cambria Math" panose="02040503050406030204" pitchFamily="18" charset="0"/>
-                          </a:rPr>
-                          <m:t>𝑇</m:t>
-                        </m:r>
-                      </m:sup>
-                    </m:sSup>
-                    <m:r>
-                      <a:rPr lang="en-CA" sz="2400" b="0" i="1" spc="-1">
-                        <a:solidFill>
-                          <a:srgbClr val="333333"/>
-                        </a:solidFill>
-                        <a:latin typeface="Cambria Math" panose="02040503050406030204" pitchFamily="18" charset="0"/>
-                      </a:rPr>
-                      <m:t>=</m:t>
-                    </m:r>
-                    <m:r>
-                      <a:rPr lang="en-CA" sz="2400" b="1" i="1" spc="-1">
-                        <a:solidFill>
-                          <a:srgbClr val="333333"/>
-                        </a:solidFill>
-                        <a:latin typeface="Cambria Math" panose="02040503050406030204" pitchFamily="18" charset="0"/>
-                      </a:rPr>
-                      <m:t>𝑨</m:t>
-                    </m:r>
-                    <m:r>
-                      <a:rPr lang="en-CA" sz="2400" b="0" i="1" spc="-1">
-                        <a:solidFill>
-                          <a:srgbClr val="333333"/>
-                        </a:solidFill>
-                        <a:latin typeface="Cambria Math" panose="02040503050406030204" pitchFamily="18" charset="0"/>
-                      </a:rPr>
-                      <m:t>)</m:t>
-                    </m:r>
-                  </m:oMath>
-                </a14:m>
-                <a:endParaRPr lang="en-CA" sz="2400" spc="-1" dirty="0">
-                  <a:solidFill>
-                    <a:srgbClr val="333333"/>
-                  </a:solidFill>
-                  <a:latin typeface="Noto Sans Regular"/>
-                </a:endParaRPr>
-              </a:p>
-              <a:p>
-                <a:pPr marL="565200" indent="-457200">
-                  <a:spcAft>
-                    <a:spcPts val="800"/>
-                  </a:spcAft>
-                  <a:buClr>
-                    <a:srgbClr val="EF2929"/>
-                  </a:buClr>
-                  <a:buSzPct val="100000"/>
-                  <a:buFont typeface="Arial" panose="020B0604020202020204" pitchFamily="34" charset="0"/>
-                  <a:buChar char="•"/>
-                </a:pPr>
-                <a:r>
-                  <a:rPr lang="en-CA" sz="2400" spc="-1" dirty="0">
-                    <a:solidFill>
-                      <a:srgbClr val="333333"/>
-                    </a:solidFill>
-                    <a:latin typeface="Noto Sans Regular"/>
-                  </a:rPr>
-                  <a:t>Positive semi-definite </a:t>
-                </a:r>
-                <a14:m>
-                  <m:oMath xmlns:m="http://schemas.openxmlformats.org/officeDocument/2006/math">
-                    <m:sSup>
-                      <m:sSupPr>
-                        <m:ctrlPr>
-                          <a:rPr lang="en-CA" sz="2400" b="1" i="1" spc="-1" smtClean="0">
-                            <a:solidFill>
-                              <a:srgbClr val="333333"/>
-                            </a:solidFill>
-                            <a:latin typeface="Cambria Math" panose="02040503050406030204" pitchFamily="18" charset="0"/>
-                          </a:rPr>
-                        </m:ctrlPr>
-                      </m:sSupPr>
-                      <m:e>
-                        <m:r>
-                          <a:rPr lang="en-CA" sz="2400" b="1" i="1" spc="-1" smtClean="0">
-                            <a:solidFill>
-                              <a:srgbClr val="333333"/>
-                            </a:solidFill>
-                            <a:latin typeface="Cambria Math" panose="02040503050406030204" pitchFamily="18" charset="0"/>
-                          </a:rPr>
-                          <m:t>𝒛</m:t>
-                        </m:r>
-                      </m:e>
-                      <m:sup>
-                        <m:r>
-                          <a:rPr lang="en-CA" sz="2400" b="1" i="1" spc="-1" smtClean="0">
-                            <a:solidFill>
-                              <a:srgbClr val="333333"/>
-                            </a:solidFill>
-                            <a:latin typeface="Cambria Math" panose="02040503050406030204" pitchFamily="18" charset="0"/>
-                          </a:rPr>
-                          <m:t>𝑻</m:t>
-                        </m:r>
-                      </m:sup>
-                    </m:sSup>
-                    <m:r>
-                      <a:rPr lang="en-CA" sz="2400" b="1" i="1" spc="-1" smtClean="0">
-                        <a:solidFill>
-                          <a:srgbClr val="333333"/>
-                        </a:solidFill>
-                        <a:latin typeface="Cambria Math" panose="02040503050406030204" pitchFamily="18" charset="0"/>
-                      </a:rPr>
-                      <m:t>𝑨𝒛</m:t>
-                    </m:r>
-                    <m:r>
-                      <a:rPr lang="en-CA" sz="2400" b="0" i="1" spc="-1" smtClean="0">
-                        <a:solidFill>
-                          <a:srgbClr val="333333"/>
-                        </a:solidFill>
-                        <a:latin typeface="Cambria Math" panose="02040503050406030204" pitchFamily="18" charset="0"/>
-                      </a:rPr>
-                      <m:t>≥0</m:t>
-                    </m:r>
-                  </m:oMath>
-                </a14:m>
-                <a:r>
-                  <a:rPr lang="en-CA" sz="2400" spc="-1" dirty="0">
-                    <a:solidFill>
-                      <a:srgbClr val="333333"/>
-                    </a:solidFill>
-                    <a:latin typeface="Noto Sans Regular"/>
-                  </a:rPr>
-                  <a:t> for any </a:t>
-                </a:r>
-                <a14:m>
-                  <m:oMath xmlns:m="http://schemas.openxmlformats.org/officeDocument/2006/math">
-                    <m:r>
-                      <a:rPr lang="en-CA" sz="2400" b="1" i="1" spc="-1" smtClean="0">
-                        <a:solidFill>
-                          <a:srgbClr val="333333"/>
-                        </a:solidFill>
-                        <a:latin typeface="Cambria Math" panose="02040503050406030204" pitchFamily="18" charset="0"/>
-                      </a:rPr>
-                      <m:t>𝒛</m:t>
-                    </m:r>
-                  </m:oMath>
-                </a14:m>
-                <a:endParaRPr lang="en-CA" sz="2400" b="1" spc="-1" dirty="0">
-                  <a:solidFill>
-                    <a:srgbClr val="333333"/>
-                  </a:solidFill>
-                  <a:latin typeface="Noto Sans Regular"/>
-                </a:endParaRPr>
-              </a:p>
-              <a:p>
-                <a:pPr marL="108000">
-                  <a:spcAft>
-                    <a:spcPts val="800"/>
-                  </a:spcAft>
-                  <a:buClr>
-                    <a:srgbClr val="EF2929"/>
-                  </a:buClr>
-                  <a:buSzPct val="100000"/>
-                </a:pPr>
-                <a:r>
-                  <a:rPr lang="en-CA" sz="2400" b="1" spc="-1" dirty="0">
-                    <a:solidFill>
-                      <a:srgbClr val="333333"/>
-                    </a:solidFill>
-                    <a:latin typeface="Noto Sans Regular"/>
-                  </a:rPr>
-                  <a:t>Total Least Squares Example:		</a:t>
-                </a:r>
-                <a14:m>
-                  <m:oMath xmlns:m="http://schemas.openxmlformats.org/officeDocument/2006/math">
-                    <m:r>
-                      <a:rPr lang="en-CA" sz="2400" b="1" i="1" spc="-1" smtClean="0">
-                        <a:solidFill>
-                          <a:srgbClr val="333333"/>
-                        </a:solidFill>
-                        <a:latin typeface="Cambria Math" panose="02040503050406030204" pitchFamily="18" charset="0"/>
-                      </a:rPr>
-                      <m:t>𝑨</m:t>
-                    </m:r>
-                    <m:r>
-                      <a:rPr lang="en-CA" sz="2400" b="1" i="1" spc="-1" smtClean="0">
-                        <a:solidFill>
-                          <a:srgbClr val="333333"/>
-                        </a:solidFill>
-                        <a:latin typeface="Cambria Math" panose="02040503050406030204" pitchFamily="18" charset="0"/>
-                      </a:rPr>
-                      <m:t>=</m:t>
-                    </m:r>
-                    <m:sSup>
-                      <m:sSupPr>
-                        <m:ctrlPr>
-                          <a:rPr lang="en-CA" sz="2400" b="1" i="1" spc="-1" smtClean="0">
-                            <a:solidFill>
-                              <a:srgbClr val="333333"/>
-                            </a:solidFill>
-                            <a:latin typeface="Cambria Math" panose="02040503050406030204" pitchFamily="18" charset="0"/>
-                          </a:rPr>
-                        </m:ctrlPr>
-                      </m:sSupPr>
-                      <m:e>
-                        <m:r>
-                          <a:rPr lang="en-CA" sz="2400" b="1" i="1" spc="-1" smtClean="0">
-                            <a:solidFill>
-                              <a:srgbClr val="333333"/>
-                            </a:solidFill>
-                            <a:latin typeface="Cambria Math" panose="02040503050406030204" pitchFamily="18" charset="0"/>
-                          </a:rPr>
-                          <m:t>𝑿</m:t>
-                        </m:r>
-                      </m:e>
-                      <m:sup>
-                        <m:r>
-                          <a:rPr lang="en-CA" sz="2400" b="1" i="1" spc="-1" smtClean="0">
-                            <a:solidFill>
-                              <a:srgbClr val="333333"/>
-                            </a:solidFill>
-                            <a:latin typeface="Cambria Math" panose="02040503050406030204" pitchFamily="18" charset="0"/>
-                          </a:rPr>
-                          <m:t>𝑻</m:t>
-                        </m:r>
-                      </m:sup>
-                    </m:sSup>
-                    <m:r>
-                      <a:rPr lang="en-CA" sz="2400" b="1" i="1" spc="-1" smtClean="0">
-                        <a:solidFill>
-                          <a:srgbClr val="333333"/>
-                        </a:solidFill>
-                        <a:latin typeface="Cambria Math" panose="02040503050406030204" pitchFamily="18" charset="0"/>
-                      </a:rPr>
-                      <m:t>𝑿</m:t>
-                    </m:r>
-                  </m:oMath>
-                </a14:m>
-                <a:endParaRPr lang="en-CA" sz="2400" b="1" spc="-1" dirty="0">
-                  <a:solidFill>
-                    <a:srgbClr val="333333"/>
-                  </a:solidFill>
-                  <a:latin typeface="Noto Sans Regular"/>
-                </a:endParaRPr>
-              </a:p>
-              <a:p>
-                <a:pPr marL="565200" indent="-457200">
-                  <a:spcAft>
-                    <a:spcPts val="800"/>
-                  </a:spcAft>
-                  <a:buClr>
-                    <a:srgbClr val="EF2929"/>
-                  </a:buClr>
-                  <a:buSzPct val="100000"/>
-                  <a:buFont typeface="Arial" panose="020B0604020202020204" pitchFamily="34" charset="0"/>
-                  <a:buChar char="•"/>
-                </a:pPr>
-                <a:r>
-                  <a:rPr lang="en-CA" sz="2400" spc="-1" dirty="0">
-                    <a:solidFill>
-                      <a:srgbClr val="333333"/>
-                    </a:solidFill>
-                    <a:latin typeface="Noto Sans Regular"/>
-                  </a:rPr>
-                  <a:t>Symmetric: </a:t>
-                </a:r>
-                <a14:m>
-                  <m:oMath xmlns:m="http://schemas.openxmlformats.org/officeDocument/2006/math">
-                    <m:sSup>
-                      <m:sSupPr>
-                        <m:ctrlPr>
-                          <a:rPr lang="en-CA" sz="2400" b="0" i="1" spc="-1" smtClean="0">
-                            <a:solidFill>
-                              <a:srgbClr val="333333"/>
-                            </a:solidFill>
-                            <a:latin typeface="Cambria Math" panose="02040503050406030204" pitchFamily="18" charset="0"/>
-                          </a:rPr>
-                        </m:ctrlPr>
-                      </m:sSupPr>
-                      <m:e>
-                        <m:d>
-                          <m:dPr>
-                            <m:ctrlPr>
-                              <a:rPr lang="en-CA" sz="2400" b="0" i="1" spc="-1" smtClean="0">
-                                <a:solidFill>
-                                  <a:srgbClr val="333333"/>
-                                </a:solidFill>
-                                <a:latin typeface="Cambria Math" panose="02040503050406030204" pitchFamily="18" charset="0"/>
-                              </a:rPr>
-                            </m:ctrlPr>
-                          </m:dPr>
-                          <m:e>
-                            <m:sSup>
-                              <m:sSupPr>
-                                <m:ctrlPr>
-                                  <a:rPr lang="en-CA" sz="2400" b="0" i="1" spc="-1" smtClean="0">
-                                    <a:solidFill>
-                                      <a:srgbClr val="333333"/>
-                                    </a:solidFill>
-                                    <a:latin typeface="Cambria Math" panose="02040503050406030204" pitchFamily="18" charset="0"/>
-                                  </a:rPr>
-                                </m:ctrlPr>
-                              </m:sSupPr>
-                              <m:e>
-                                <m:r>
-                                  <a:rPr lang="en-CA" sz="2400" b="1" i="1" spc="-1" smtClean="0">
-                                    <a:solidFill>
-                                      <a:srgbClr val="333333"/>
-                                    </a:solidFill>
-                                    <a:latin typeface="Cambria Math" panose="02040503050406030204" pitchFamily="18" charset="0"/>
-                                  </a:rPr>
-                                  <m:t>𝑿</m:t>
-                                </m:r>
-                              </m:e>
-                              <m:sup>
-                                <m:r>
-                                  <a:rPr lang="en-CA" sz="2400" b="0" i="1" spc="-1" smtClean="0">
-                                    <a:solidFill>
-                                      <a:srgbClr val="333333"/>
-                                    </a:solidFill>
-                                    <a:latin typeface="Cambria Math" panose="02040503050406030204" pitchFamily="18" charset="0"/>
-                                  </a:rPr>
-                                  <m:t>𝑇</m:t>
-                                </m:r>
-                              </m:sup>
-                            </m:sSup>
-                            <m:r>
-                              <a:rPr lang="en-CA" sz="2400" b="1" i="1" spc="-1" smtClean="0">
-                                <a:solidFill>
-                                  <a:srgbClr val="333333"/>
-                                </a:solidFill>
-                                <a:latin typeface="Cambria Math" panose="02040503050406030204" pitchFamily="18" charset="0"/>
-                              </a:rPr>
-                              <m:t>𝑿</m:t>
-                            </m:r>
-                          </m:e>
-                        </m:d>
-                      </m:e>
-                      <m:sup>
-                        <m:r>
-                          <a:rPr lang="en-CA" sz="2400" b="0" i="1" spc="-1" smtClean="0">
-                            <a:solidFill>
-                              <a:srgbClr val="333333"/>
-                            </a:solidFill>
-                            <a:latin typeface="Cambria Math" panose="02040503050406030204" pitchFamily="18" charset="0"/>
-                          </a:rPr>
-                          <m:t>𝑇</m:t>
-                        </m:r>
-                      </m:sup>
-                    </m:sSup>
-                    <m:r>
-                      <a:rPr lang="en-CA" sz="2400" b="0" i="1" spc="-1" smtClean="0">
-                        <a:solidFill>
-                          <a:srgbClr val="333333"/>
-                        </a:solidFill>
-                        <a:latin typeface="Cambria Math" panose="02040503050406030204" pitchFamily="18" charset="0"/>
-                      </a:rPr>
-                      <m:t>=</m:t>
-                    </m:r>
-                    <m:sSup>
-                      <m:sSupPr>
-                        <m:ctrlPr>
-                          <a:rPr lang="en-CA" sz="2400" b="0" i="1" spc="-1" smtClean="0">
-                            <a:solidFill>
-                              <a:srgbClr val="333333"/>
-                            </a:solidFill>
-                            <a:latin typeface="Cambria Math" panose="02040503050406030204" pitchFamily="18" charset="0"/>
-                          </a:rPr>
-                        </m:ctrlPr>
-                      </m:sSupPr>
-                      <m:e>
-                        <m:r>
-                          <a:rPr lang="en-CA" sz="2400" b="1" i="1" spc="-1" smtClean="0">
-                            <a:solidFill>
-                              <a:srgbClr val="333333"/>
-                            </a:solidFill>
-                            <a:latin typeface="Cambria Math" panose="02040503050406030204" pitchFamily="18" charset="0"/>
-                          </a:rPr>
-                          <m:t>𝑿</m:t>
-                        </m:r>
-                      </m:e>
-                      <m:sup>
-                        <m:r>
-                          <a:rPr lang="en-CA" sz="2400" b="0" i="1" spc="-1" smtClean="0">
-                            <a:solidFill>
-                              <a:srgbClr val="333333"/>
-                            </a:solidFill>
-                            <a:latin typeface="Cambria Math" panose="02040503050406030204" pitchFamily="18" charset="0"/>
-                          </a:rPr>
-                          <m:t>𝑇</m:t>
-                        </m:r>
-                      </m:sup>
-                    </m:sSup>
-                    <m:r>
-                      <a:rPr lang="en-CA" sz="2400" b="1" i="1" spc="-1" smtClean="0">
-                        <a:solidFill>
-                          <a:srgbClr val="333333"/>
-                        </a:solidFill>
-                        <a:latin typeface="Cambria Math" panose="02040503050406030204" pitchFamily="18" charset="0"/>
-                      </a:rPr>
-                      <m:t>𝑿</m:t>
-                    </m:r>
-                  </m:oMath>
-                </a14:m>
-                <a:endParaRPr lang="en-CA" sz="2400" b="1" spc="-1" dirty="0">
-                  <a:solidFill>
-                    <a:srgbClr val="333333"/>
-                  </a:solidFill>
-                  <a:latin typeface="Noto Sans Regular"/>
-                </a:endParaRPr>
-              </a:p>
-              <a:p>
-                <a:pPr marL="565200" indent="-457200">
-                  <a:spcAft>
-                    <a:spcPts val="800"/>
-                  </a:spcAft>
-                  <a:buClr>
-                    <a:srgbClr val="EF2929"/>
-                  </a:buClr>
-                  <a:buSzPct val="100000"/>
-                  <a:buFont typeface="Arial" panose="020B0604020202020204" pitchFamily="34" charset="0"/>
-                  <a:buChar char="•"/>
-                </a:pPr>
-                <a:r>
-                  <a:rPr lang="en-CA" sz="2400" spc="-1" dirty="0">
-                    <a:solidFill>
-                      <a:srgbClr val="333333"/>
-                    </a:solidFill>
-                    <a:latin typeface="Noto Sans Regular"/>
-                  </a:rPr>
-                  <a:t>Positive semi-definite: </a:t>
-                </a:r>
-                <a14:m>
-                  <m:oMath xmlns:m="http://schemas.openxmlformats.org/officeDocument/2006/math">
-                    <m:sSup>
-                      <m:sSupPr>
-                        <m:ctrlPr>
-                          <a:rPr lang="en-CA" sz="2400" b="0" i="1" spc="-1" smtClean="0">
-                            <a:solidFill>
-                              <a:srgbClr val="333333"/>
-                            </a:solidFill>
-                            <a:latin typeface="Cambria Math" panose="02040503050406030204" pitchFamily="18" charset="0"/>
-                          </a:rPr>
-                        </m:ctrlPr>
-                      </m:sSupPr>
-                      <m:e>
-                        <m:r>
-                          <a:rPr lang="en-CA" sz="2400" b="1" i="1" spc="-1" smtClean="0">
-                            <a:solidFill>
-                              <a:srgbClr val="333333"/>
-                            </a:solidFill>
-                            <a:latin typeface="Cambria Math" panose="02040503050406030204" pitchFamily="18" charset="0"/>
-                          </a:rPr>
-                          <m:t>𝒛</m:t>
-                        </m:r>
-                      </m:e>
-                      <m:sup>
-                        <m:r>
-                          <a:rPr lang="en-CA" sz="2400" b="0" i="1" spc="-1" smtClean="0">
-                            <a:solidFill>
-                              <a:srgbClr val="333333"/>
-                            </a:solidFill>
-                            <a:latin typeface="Cambria Math" panose="02040503050406030204" pitchFamily="18" charset="0"/>
-                          </a:rPr>
-                          <m:t>𝑇</m:t>
-                        </m:r>
-                      </m:sup>
-                    </m:sSup>
-                    <m:sSup>
-                      <m:sSupPr>
-                        <m:ctrlPr>
-                          <a:rPr lang="en-CA" sz="2400" b="0" i="1" spc="-1" smtClean="0">
-                            <a:solidFill>
-                              <a:srgbClr val="333333"/>
-                            </a:solidFill>
-                            <a:latin typeface="Cambria Math" panose="02040503050406030204" pitchFamily="18" charset="0"/>
-                          </a:rPr>
-                        </m:ctrlPr>
-                      </m:sSupPr>
-                      <m:e>
-                        <m:r>
-                          <a:rPr lang="en-CA" sz="2400" b="1" i="1" spc="-1" smtClean="0">
-                            <a:solidFill>
-                              <a:srgbClr val="333333"/>
-                            </a:solidFill>
-                            <a:latin typeface="Cambria Math" panose="02040503050406030204" pitchFamily="18" charset="0"/>
-                          </a:rPr>
-                          <m:t>𝑿</m:t>
-                        </m:r>
-                      </m:e>
-                      <m:sup>
-                        <m:r>
-                          <a:rPr lang="en-CA" sz="2400" b="0" i="1" spc="-1" smtClean="0">
-                            <a:solidFill>
-                              <a:srgbClr val="333333"/>
-                            </a:solidFill>
-                            <a:latin typeface="Cambria Math" panose="02040503050406030204" pitchFamily="18" charset="0"/>
-                          </a:rPr>
-                          <m:t>𝑇</m:t>
-                        </m:r>
-                      </m:sup>
-                    </m:sSup>
-                    <m:r>
-                      <a:rPr lang="en-CA" sz="2400" b="1" i="1" spc="-1" smtClean="0">
-                        <a:solidFill>
-                          <a:srgbClr val="333333"/>
-                        </a:solidFill>
-                        <a:latin typeface="Cambria Math" panose="02040503050406030204" pitchFamily="18" charset="0"/>
-                      </a:rPr>
-                      <m:t>𝑿𝒛</m:t>
-                    </m:r>
-                    <m:r>
-                      <a:rPr lang="en-CA" sz="2400" b="0" i="1" spc="-1" smtClean="0">
-                        <a:solidFill>
-                          <a:srgbClr val="333333"/>
-                        </a:solidFill>
-                        <a:latin typeface="Cambria Math" panose="02040503050406030204" pitchFamily="18" charset="0"/>
-                      </a:rPr>
-                      <m:t>=</m:t>
-                    </m:r>
-                    <m:sSup>
-                      <m:sSupPr>
-                        <m:ctrlPr>
-                          <a:rPr lang="en-CA" sz="2400" b="0" i="1" spc="-1" smtClean="0">
-                            <a:solidFill>
-                              <a:srgbClr val="333333"/>
-                            </a:solidFill>
-                            <a:latin typeface="Cambria Math" panose="02040503050406030204" pitchFamily="18" charset="0"/>
-                          </a:rPr>
-                        </m:ctrlPr>
-                      </m:sSupPr>
-                      <m:e>
-                        <m:d>
-                          <m:dPr>
-                            <m:ctrlPr>
-                              <a:rPr lang="en-CA" sz="2400" b="0" i="1" spc="-1" smtClean="0">
-                                <a:solidFill>
-                                  <a:srgbClr val="333333"/>
-                                </a:solidFill>
-                                <a:latin typeface="Cambria Math" panose="02040503050406030204" pitchFamily="18" charset="0"/>
-                              </a:rPr>
-                            </m:ctrlPr>
-                          </m:dPr>
-                          <m:e>
-                            <m:r>
-                              <a:rPr lang="en-CA" sz="2400" b="1" i="1" spc="-1" smtClean="0">
-                                <a:solidFill>
-                                  <a:srgbClr val="333333"/>
-                                </a:solidFill>
-                                <a:latin typeface="Cambria Math" panose="02040503050406030204" pitchFamily="18" charset="0"/>
-                              </a:rPr>
-                              <m:t>𝑿𝒛</m:t>
-                            </m:r>
-                          </m:e>
-                        </m:d>
-                      </m:e>
-                      <m:sup>
-                        <m:r>
-                          <a:rPr lang="en-CA" sz="2400" b="0" i="1" spc="-1" smtClean="0">
-                            <a:solidFill>
-                              <a:srgbClr val="333333"/>
-                            </a:solidFill>
-                            <a:latin typeface="Cambria Math" panose="02040503050406030204" pitchFamily="18" charset="0"/>
-                          </a:rPr>
-                          <m:t>𝑇</m:t>
-                        </m:r>
-                      </m:sup>
-                    </m:sSup>
-                    <m:d>
-                      <m:dPr>
-                        <m:ctrlPr>
-                          <a:rPr lang="en-CA" sz="2400" b="0" i="1" spc="-1" smtClean="0">
-                            <a:solidFill>
-                              <a:srgbClr val="333333"/>
-                            </a:solidFill>
-                            <a:latin typeface="Cambria Math" panose="02040503050406030204" pitchFamily="18" charset="0"/>
-                          </a:rPr>
-                        </m:ctrlPr>
-                      </m:dPr>
-                      <m:e>
-                        <m:r>
-                          <a:rPr lang="en-CA" sz="2400" b="1" i="1" spc="-1" smtClean="0">
-                            <a:solidFill>
-                              <a:srgbClr val="333333"/>
-                            </a:solidFill>
-                            <a:latin typeface="Cambria Math" panose="02040503050406030204" pitchFamily="18" charset="0"/>
-                          </a:rPr>
-                          <m:t>𝑿𝒛</m:t>
-                        </m:r>
-                      </m:e>
-                    </m:d>
-                    <m:r>
-                      <a:rPr lang="en-CA" sz="2400" b="0" i="1" spc="-1" smtClean="0">
-                        <a:solidFill>
-                          <a:srgbClr val="333333"/>
-                        </a:solidFill>
-                        <a:latin typeface="Cambria Math" panose="02040503050406030204" pitchFamily="18" charset="0"/>
-                      </a:rPr>
-                      <m:t>=</m:t>
-                    </m:r>
-                    <m:sSup>
-                      <m:sSupPr>
-                        <m:ctrlPr>
-                          <a:rPr lang="en-CA" sz="2400" b="0" i="1" spc="-1" smtClean="0">
-                            <a:solidFill>
-                              <a:srgbClr val="333333"/>
-                            </a:solidFill>
-                            <a:latin typeface="Cambria Math" panose="02040503050406030204" pitchFamily="18" charset="0"/>
-                          </a:rPr>
-                        </m:ctrlPr>
-                      </m:sSupPr>
-                      <m:e>
-                        <m:d>
-                          <m:dPr>
-                            <m:begChr m:val="|"/>
-                            <m:endChr m:val="|"/>
-                            <m:ctrlPr>
-                              <a:rPr lang="en-CA" sz="2400" b="0" i="1" spc="-1" smtClean="0">
-                                <a:solidFill>
-                                  <a:srgbClr val="333333"/>
-                                </a:solidFill>
-                                <a:latin typeface="Cambria Math" panose="02040503050406030204" pitchFamily="18" charset="0"/>
-                              </a:rPr>
-                            </m:ctrlPr>
-                          </m:dPr>
-                          <m:e>
-                            <m:d>
-                              <m:dPr>
-                                <m:begChr m:val="|"/>
-                                <m:endChr m:val="|"/>
-                                <m:ctrlPr>
-                                  <a:rPr lang="en-CA" sz="2400" b="0" i="1" spc="-1" smtClean="0">
-                                    <a:solidFill>
-                                      <a:srgbClr val="333333"/>
-                                    </a:solidFill>
-                                    <a:latin typeface="Cambria Math" panose="02040503050406030204" pitchFamily="18" charset="0"/>
-                                  </a:rPr>
-                                </m:ctrlPr>
-                              </m:dPr>
-                              <m:e>
-                                <m:r>
-                                  <a:rPr lang="en-CA" sz="2400" b="1" i="1" spc="-1" smtClean="0">
-                                    <a:solidFill>
-                                      <a:srgbClr val="333333"/>
-                                    </a:solidFill>
-                                    <a:latin typeface="Cambria Math" panose="02040503050406030204" pitchFamily="18" charset="0"/>
-                                  </a:rPr>
-                                  <m:t>𝑿𝒛</m:t>
-                                </m:r>
-                              </m:e>
-                            </m:d>
-                          </m:e>
-                        </m:d>
-                      </m:e>
-                      <m:sup>
-                        <m:r>
-                          <a:rPr lang="en-CA" sz="2400" b="0" i="1" spc="-1" smtClean="0">
-                            <a:solidFill>
-                              <a:srgbClr val="333333"/>
-                            </a:solidFill>
-                            <a:latin typeface="Cambria Math" panose="02040503050406030204" pitchFamily="18" charset="0"/>
-                          </a:rPr>
-                          <m:t>2</m:t>
-                        </m:r>
-                      </m:sup>
-                    </m:sSup>
-                    <m:r>
-                      <a:rPr lang="en-CA" sz="2400" b="0" i="1" spc="-1" smtClean="0">
-                        <a:solidFill>
-                          <a:srgbClr val="333333"/>
-                        </a:solidFill>
-                        <a:latin typeface="Cambria Math" panose="02040503050406030204" pitchFamily="18" charset="0"/>
-                      </a:rPr>
-                      <m:t>≥0</m:t>
-                    </m:r>
-                  </m:oMath>
-                </a14:m>
-                <a:endParaRPr lang="en-CA" sz="2400" b="1" spc="-1" dirty="0">
-                  <a:solidFill>
-                    <a:srgbClr val="333333"/>
-                  </a:solidFill>
-                  <a:latin typeface="Noto Sans Regular"/>
-                </a:endParaRPr>
-              </a:p>
-            </p:txBody>
-          </p:sp>
-        </mc:Choice>
-        <mc:Fallback xmlns="">
-          <p:sp>
-            <p:nvSpPr>
-              <p:cNvPr id="6" name="TextShape 2">
-                <a:extLst>
-                  <a:ext uri="{FF2B5EF4-FFF2-40B4-BE49-F238E27FC236}">
-                    <a16:creationId xmlns:a16="http://schemas.microsoft.com/office/drawing/2014/main" id="{60BEF98C-8896-4CC1-BA48-04B35A72CF20}"/>
-                  </a:ext>
-                </a:extLst>
-              </p:cNvPr>
-              <p:cNvSpPr txBox="1">
-                <a:spLocks noRot="1" noChangeAspect="1" noMove="1" noResize="1" noEditPoints="1" noAdjustHandles="1" noChangeArrowheads="1" noChangeShapeType="1" noTextEdit="1"/>
-              </p:cNvSpPr>
-              <p:nvPr/>
-            </p:nvSpPr>
-            <p:spPr>
-              <a:xfrm>
-                <a:off x="252000" y="1767513"/>
-                <a:ext cx="8640000" cy="2804327"/>
-              </a:xfrm>
-              <a:prstGeom prst="rect">
-                <a:avLst/>
-              </a:prstGeom>
-              <a:blipFill>
-                <a:blip r:embed="rId2"/>
-                <a:stretch>
-                  <a:fillRect l="-846" t="-3478" b="-6957"/>
-                </a:stretch>
-              </a:blipFill>
-              <a:ln>
-                <a:noFill/>
-              </a:ln>
-            </p:spPr>
-            <p:txBody>
-              <a:bodyPr/>
-              <a:lstStyle/>
-              <a:p>
-                <a:r>
-                  <a:rPr lang="en-CA">
-                    <a:noFill/>
-                  </a:rPr>
-                  <a:t> </a:t>
-                </a:r>
-              </a:p>
-            </p:txBody>
-          </p:sp>
-        </mc:Fallback>
-      </mc:AlternateContent>
-      <p:cxnSp>
-        <p:nvCxnSpPr>
-          <p:cNvPr id="3" name="Straight Connector 2">
-            <a:extLst>
-              <a:ext uri="{FF2B5EF4-FFF2-40B4-BE49-F238E27FC236}">
-                <a16:creationId xmlns:a16="http://schemas.microsoft.com/office/drawing/2014/main" id="{60C50727-D3E8-40E5-852D-40893C8CE38B}"/>
-              </a:ext>
-            </a:extLst>
-          </p:cNvPr>
-          <p:cNvCxnSpPr>
-            <a:cxnSpLocks/>
-          </p:cNvCxnSpPr>
-          <p:nvPr/>
-        </p:nvCxnSpPr>
-        <p:spPr>
-          <a:xfrm>
-            <a:off x="4316361" y="4951767"/>
-            <a:ext cx="0" cy="1804072"/>
-          </a:xfrm>
-          <a:prstGeom prst="line">
-            <a:avLst/>
-          </a:prstGeom>
-          <a:ln>
-            <a:solidFill>
-              <a:schemeClr val="tx1"/>
-            </a:solidFill>
-          </a:ln>
-        </p:spPr>
-        <p:style>
-          <a:lnRef idx="1">
-            <a:schemeClr val="accent1"/>
-          </a:lnRef>
-          <a:fillRef idx="0">
-            <a:schemeClr val="accent1"/>
-          </a:fillRef>
-          <a:effectRef idx="0">
-            <a:schemeClr val="accent1"/>
-          </a:effectRef>
-          <a:fontRef idx="minor">
-            <a:schemeClr val="tx1"/>
-          </a:fontRef>
-        </p:style>
-      </p:cxnSp>
-      <p:cxnSp>
-        <p:nvCxnSpPr>
-          <p:cNvPr id="8" name="Straight Connector 7">
-            <a:extLst>
-              <a:ext uri="{FF2B5EF4-FFF2-40B4-BE49-F238E27FC236}">
-                <a16:creationId xmlns:a16="http://schemas.microsoft.com/office/drawing/2014/main" id="{0F52D11D-3F29-4646-B199-9D420FB4BE8A}"/>
-              </a:ext>
-            </a:extLst>
-          </p:cNvPr>
-          <p:cNvCxnSpPr>
-            <a:cxnSpLocks/>
-          </p:cNvCxnSpPr>
-          <p:nvPr/>
-        </p:nvCxnSpPr>
-        <p:spPr>
-          <a:xfrm>
-            <a:off x="585633" y="5413432"/>
-            <a:ext cx="7929717" cy="0"/>
-          </a:xfrm>
-          <a:prstGeom prst="line">
-            <a:avLst/>
-          </a:prstGeom>
-          <a:ln>
-            <a:solidFill>
-              <a:schemeClr val="tx1"/>
-            </a:solidFill>
-          </a:ln>
-        </p:spPr>
-        <p:style>
-          <a:lnRef idx="1">
-            <a:schemeClr val="accent1"/>
-          </a:lnRef>
-          <a:fillRef idx="0">
-            <a:schemeClr val="accent1"/>
-          </a:fillRef>
-          <a:effectRef idx="0">
-            <a:schemeClr val="accent1"/>
-          </a:effectRef>
-          <a:fontRef idx="minor">
-            <a:schemeClr val="tx1"/>
-          </a:fontRef>
-        </p:style>
-      </p:cxnSp>
-      <p:sp>
-        <p:nvSpPr>
-          <p:cNvPr id="10" name="TextBox 9">
-            <a:extLst>
-              <a:ext uri="{FF2B5EF4-FFF2-40B4-BE49-F238E27FC236}">
-                <a16:creationId xmlns:a16="http://schemas.microsoft.com/office/drawing/2014/main" id="{A63306B0-D831-48EF-AF62-99B327D11ADC}"/>
-              </a:ext>
-            </a:extLst>
-          </p:cNvPr>
-          <p:cNvSpPr txBox="1"/>
-          <p:nvPr/>
-        </p:nvSpPr>
-        <p:spPr>
-          <a:xfrm>
-            <a:off x="1039989" y="4951767"/>
-            <a:ext cx="2725105" cy="461665"/>
-          </a:xfrm>
-          <a:prstGeom prst="rect">
-            <a:avLst/>
-          </a:prstGeom>
-          <a:noFill/>
-        </p:spPr>
-        <p:txBody>
-          <a:bodyPr wrap="none" rtlCol="0">
-            <a:spAutoFit/>
-          </a:bodyPr>
-          <a:lstStyle/>
-          <a:p>
-            <a:r>
-              <a:rPr lang="en-CA" sz="2400" dirty="0" err="1"/>
-              <a:t>Eigendecomposition</a:t>
-            </a:r>
-            <a:endParaRPr lang="en-CA" sz="2400" dirty="0"/>
-          </a:p>
-        </p:txBody>
-      </p:sp>
-      <p:sp>
-        <p:nvSpPr>
-          <p:cNvPr id="11" name="TextBox 10">
-            <a:extLst>
-              <a:ext uri="{FF2B5EF4-FFF2-40B4-BE49-F238E27FC236}">
-                <a16:creationId xmlns:a16="http://schemas.microsoft.com/office/drawing/2014/main" id="{752D7ACF-AAB2-4998-99F0-7A04DE5D9711}"/>
-              </a:ext>
-            </a:extLst>
-          </p:cNvPr>
-          <p:cNvSpPr txBox="1"/>
-          <p:nvPr/>
-        </p:nvSpPr>
-        <p:spPr>
-          <a:xfrm>
-            <a:off x="6114202" y="4899046"/>
-            <a:ext cx="687496" cy="461665"/>
-          </a:xfrm>
-          <a:prstGeom prst="rect">
-            <a:avLst/>
-          </a:prstGeom>
-          <a:noFill/>
-        </p:spPr>
-        <p:txBody>
-          <a:bodyPr wrap="none" rtlCol="0">
-            <a:spAutoFit/>
-          </a:bodyPr>
-          <a:lstStyle/>
-          <a:p>
-            <a:r>
-              <a:rPr lang="en-CA" sz="2400" dirty="0"/>
-              <a:t>SVD</a:t>
-            </a:r>
-          </a:p>
-        </p:txBody>
-      </p:sp>
-      <mc:AlternateContent xmlns:mc="http://schemas.openxmlformats.org/markup-compatibility/2006" xmlns:a14="http://schemas.microsoft.com/office/drawing/2010/main">
-        <mc:Choice Requires="a14">
-          <p:sp>
-            <p:nvSpPr>
-              <p:cNvPr id="12" name="Rectangle 11">
-                <a:extLst>
-                  <a:ext uri="{FF2B5EF4-FFF2-40B4-BE49-F238E27FC236}">
-                    <a16:creationId xmlns:a16="http://schemas.microsoft.com/office/drawing/2014/main" id="{73402BCD-3468-4710-97F1-B132D12B2489}"/>
+                    <a16:creationId xmlns:a16="http://schemas.microsoft.com/office/drawing/2014/main" id="{EF571DAB-CAAC-4CB5-B2F3-95D18819EDA3}"/>
                   </a:ext>
                 </a:extLst>
               </p:cNvPr>
@@ -32483,152 +31582,149 @@
             </p:nvSpPr>
             <p:spPr>
               <a:xfrm>
-                <a:off x="1155084" y="5793355"/>
-                <a:ext cx="2610010" cy="468205"/>
+                <a:off x="1909762" y="5140405"/>
+                <a:ext cx="5324475" cy="430887"/>
               </a:xfrm>
               <a:prstGeom prst="rect">
                 <a:avLst/>
               </a:prstGeom>
             </p:spPr>
             <p:txBody>
-              <a:bodyPr wrap="none">
+              <a:bodyPr wrap="square">
                 <a:spAutoFit/>
               </a:bodyPr>
               <a:lstStyle/>
               <a:p>
-                <a:pPr/>
+                <a:pPr marL="108000" algn="ctr">
+                  <a:spcAft>
+                    <a:spcPts val="1414"/>
+                  </a:spcAft>
+                  <a:buClr>
+                    <a:srgbClr val="EF2929"/>
+                  </a:buClr>
+                  <a:buSzPct val="100000"/>
+                </a:pPr>
+                <a:r>
+                  <a:rPr lang="en-CA" sz="2200" spc="-1" dirty="0">
+                    <a:solidFill>
+                      <a:srgbClr val="333333"/>
+                    </a:solidFill>
+                    <a:latin typeface="Noto Sans Regular"/>
+                  </a:rPr>
+                  <a:t>(where </a:t>
+                </a:r>
                 <a14:m>
-                  <m:oMathPara xmlns:m="http://schemas.openxmlformats.org/officeDocument/2006/math">
-                    <m:oMathParaPr>
-                      <m:jc m:val="centerGroup"/>
-                    </m:oMathParaPr>
-                    <m:oMath xmlns:m="http://schemas.openxmlformats.org/officeDocument/2006/math">
-                      <m:sSup>
-                        <m:sSupPr>
-                          <m:ctrlPr>
-                            <a:rPr lang="en-CA" sz="2400" b="1" i="1" spc="-1" smtClean="0">
-                              <a:solidFill>
-                                <a:srgbClr val="333333"/>
-                              </a:solidFill>
-                              <a:latin typeface="Cambria Math" panose="02040503050406030204" pitchFamily="18" charset="0"/>
-                            </a:rPr>
-                          </m:ctrlPr>
-                        </m:sSupPr>
-                        <m:e>
-                          <m:r>
-                            <a:rPr lang="en-CA" sz="2400" b="1" i="1" spc="-1">
-                              <a:solidFill>
-                                <a:srgbClr val="333333"/>
-                              </a:solidFill>
-                              <a:latin typeface="Cambria Math" panose="02040503050406030204" pitchFamily="18" charset="0"/>
-                            </a:rPr>
-                            <m:t>𝑿</m:t>
-                          </m:r>
-                        </m:e>
-                        <m:sup>
-                          <m:r>
-                            <a:rPr lang="en-CA" sz="2400" b="1" i="1" spc="-1">
-                              <a:solidFill>
-                                <a:srgbClr val="333333"/>
-                              </a:solidFill>
-                              <a:latin typeface="Cambria Math" panose="02040503050406030204" pitchFamily="18" charset="0"/>
-                            </a:rPr>
-                            <m:t>𝑻</m:t>
-                          </m:r>
-                        </m:sup>
-                      </m:sSup>
-                      <m:r>
-                        <a:rPr lang="en-CA" sz="2400" b="1" i="1" spc="-1">
-                          <a:solidFill>
-                            <a:srgbClr val="333333"/>
-                          </a:solidFill>
-                          <a:latin typeface="Cambria Math" panose="02040503050406030204" pitchFamily="18" charset="0"/>
-                        </a:rPr>
-                        <m:t>𝑿</m:t>
-                      </m:r>
-                      <m:r>
-                        <a:rPr lang="en-CA" sz="2400" b="1" i="1" spc="-1" smtClean="0">
-                          <a:solidFill>
-                            <a:srgbClr val="333333"/>
-                          </a:solidFill>
-                          <a:latin typeface="Cambria Math" panose="02040503050406030204" pitchFamily="18" charset="0"/>
-                        </a:rPr>
-                        <m:t>=</m:t>
-                      </m:r>
-                      <m:r>
-                        <a:rPr lang="en-CA" sz="2400" b="1" i="1" spc="-1" smtClean="0">
-                          <a:solidFill>
-                            <a:srgbClr val="333333"/>
-                          </a:solidFill>
-                          <a:latin typeface="Cambria Math" panose="02040503050406030204" pitchFamily="18" charset="0"/>
-                        </a:rPr>
-                        <m:t>𝑨</m:t>
-                      </m:r>
-                      <m:r>
-                        <a:rPr lang="en-CA" sz="2400" b="1" i="1" spc="-1" smtClean="0">
-                          <a:solidFill>
-                            <a:srgbClr val="333333"/>
-                          </a:solidFill>
-                          <a:latin typeface="Cambria Math" panose="02040503050406030204" pitchFamily="18" charset="0"/>
-                        </a:rPr>
-                        <m:t>=</m:t>
-                      </m:r>
-                      <m:r>
-                        <a:rPr lang="en-CA" sz="2400" b="1" i="1" spc="-1" smtClean="0">
-                          <a:solidFill>
-                            <a:srgbClr val="333333"/>
-                          </a:solidFill>
-                          <a:latin typeface="Cambria Math" panose="02040503050406030204" pitchFamily="18" charset="0"/>
-                        </a:rPr>
-                        <m:t>𝑽</m:t>
-                      </m:r>
-                      <m:r>
-                        <a:rPr lang="en-CA" sz="2400" b="1" i="0" spc="-1" smtClean="0">
-                          <a:solidFill>
-                            <a:srgbClr val="333333"/>
-                          </a:solidFill>
-                          <a:latin typeface="Cambria Math" panose="02040503050406030204" pitchFamily="18" charset="0"/>
-                        </a:rPr>
-                        <m:t>𝚲</m:t>
-                      </m:r>
-                      <m:sSup>
-                        <m:sSupPr>
-                          <m:ctrlPr>
-                            <a:rPr lang="en-CA" sz="2400" b="1" i="1" spc="-1" smtClean="0">
-                              <a:solidFill>
-                                <a:srgbClr val="333333"/>
-                              </a:solidFill>
-                              <a:latin typeface="Cambria Math" panose="02040503050406030204" pitchFamily="18" charset="0"/>
-                            </a:rPr>
-                          </m:ctrlPr>
-                        </m:sSupPr>
-                        <m:e>
-                          <m:r>
-                            <a:rPr lang="en-CA" sz="2400" b="1" i="0" spc="-1" smtClean="0">
-                              <a:solidFill>
-                                <a:srgbClr val="333333"/>
-                              </a:solidFill>
-                              <a:latin typeface="Cambria Math" panose="02040503050406030204" pitchFamily="18" charset="0"/>
-                            </a:rPr>
-                            <m:t>𝐕</m:t>
-                          </m:r>
-                        </m:e>
-                        <m:sup>
-                          <m:r>
-                            <a:rPr lang="en-CA" sz="2400" b="1" i="0" spc="-1" smtClean="0">
-                              <a:solidFill>
-                                <a:srgbClr val="333333"/>
-                              </a:solidFill>
-                              <a:latin typeface="Cambria Math" panose="02040503050406030204" pitchFamily="18" charset="0"/>
-                            </a:rPr>
-                            <m:t>𝐓</m:t>
-                          </m:r>
-                        </m:sup>
-                      </m:sSup>
-                    </m:oMath>
-                  </m:oMathPara>
+                  <m:oMath xmlns:m="http://schemas.openxmlformats.org/officeDocument/2006/math">
+                    <m:r>
+                      <a:rPr lang="en-CA" sz="2000" b="1" i="1" spc="-1">
+                        <a:solidFill>
+                          <a:srgbClr val="00B050"/>
+                        </a:solidFill>
+                        <a:latin typeface="Cambria Math" panose="02040503050406030204" pitchFamily="18" charset="0"/>
+                      </a:rPr>
+                      <m:t>𝑽</m:t>
+                    </m:r>
+                    <m:sSup>
+                      <m:sSupPr>
+                        <m:ctrlPr>
+                          <a:rPr lang="en-CA" sz="2000" i="1" spc="-1">
+                            <a:solidFill>
+                              <a:srgbClr val="00B050"/>
+                            </a:solidFill>
+                            <a:latin typeface="Cambria Math" panose="02040503050406030204" pitchFamily="18" charset="0"/>
+                          </a:rPr>
+                        </m:ctrlPr>
+                      </m:sSupPr>
+                      <m:e>
+                        <m:r>
+                          <a:rPr lang="en-CA" sz="2000" b="1" i="1" spc="-1">
+                            <a:solidFill>
+                              <a:srgbClr val="00B050"/>
+                            </a:solidFill>
+                            <a:latin typeface="Cambria Math" panose="02040503050406030204" pitchFamily="18" charset="0"/>
+                          </a:rPr>
+                          <m:t>𝚺</m:t>
+                        </m:r>
+                      </m:e>
+                      <m:sup>
+                        <m:r>
+                          <a:rPr lang="en-CA" sz="2000" b="0" i="0" spc="-1" smtClean="0">
+                            <a:solidFill>
+                              <a:srgbClr val="00B050"/>
+                            </a:solidFill>
+                            <a:latin typeface="Cambria Math" panose="02040503050406030204" pitchFamily="18" charset="0"/>
+                          </a:rPr>
+                          <m:t>−1</m:t>
+                        </m:r>
+                      </m:sup>
+                    </m:sSup>
+                    <m:sSup>
+                      <m:sSupPr>
+                        <m:ctrlPr>
+                          <a:rPr lang="en-CA" sz="2000" b="1" i="1" spc="-1" dirty="0">
+                            <a:solidFill>
+                              <a:srgbClr val="00B050"/>
+                            </a:solidFill>
+                            <a:latin typeface="Cambria Math" panose="02040503050406030204" pitchFamily="18" charset="0"/>
+                          </a:rPr>
+                        </m:ctrlPr>
+                      </m:sSupPr>
+                      <m:e>
+                        <m:r>
+                          <a:rPr lang="en-CA" sz="2000" b="1" i="1" spc="-1" dirty="0">
+                            <a:solidFill>
+                              <a:srgbClr val="00B050"/>
+                            </a:solidFill>
+                            <a:latin typeface="Cambria Math" panose="02040503050406030204" pitchFamily="18" charset="0"/>
+                          </a:rPr>
+                          <m:t>𝑼</m:t>
+                        </m:r>
+                      </m:e>
+                      <m:sup>
+                        <m:r>
+                          <a:rPr lang="en-CA" sz="2000" b="1" i="1" spc="-1" dirty="0">
+                            <a:solidFill>
+                              <a:srgbClr val="00B050"/>
+                            </a:solidFill>
+                            <a:latin typeface="Cambria Math" panose="02040503050406030204" pitchFamily="18" charset="0"/>
+                          </a:rPr>
+                          <m:t>𝑻</m:t>
+                        </m:r>
+                      </m:sup>
+                    </m:sSup>
+                  </m:oMath>
                 </a14:m>
-                <a:endParaRPr lang="en-CA" sz="2400" dirty="0"/>
+                <a:r>
+                  <a:rPr lang="en-CA" sz="2200" spc="-1" dirty="0">
+                    <a:solidFill>
+                      <a:srgbClr val="333333"/>
+                    </a:solidFill>
+                    <a:latin typeface="Noto Sans Regular"/>
+                  </a:rPr>
+                  <a:t> is computed from SVD of </a:t>
+                </a:r>
+                <a14:m>
+                  <m:oMath xmlns:m="http://schemas.openxmlformats.org/officeDocument/2006/math">
+                    <m:r>
+                      <a:rPr lang="en-CA" sz="2200" b="0" i="1" spc="-1" smtClean="0">
+                        <a:solidFill>
+                          <a:srgbClr val="333333"/>
+                        </a:solidFill>
+                        <a:latin typeface="Cambria Math" panose="02040503050406030204" pitchFamily="18" charset="0"/>
+                      </a:rPr>
+                      <m:t>𝑋</m:t>
+                    </m:r>
+                  </m:oMath>
+                </a14:m>
+                <a:r>
+                  <a:rPr lang="en-CA" sz="2200" spc="-1" dirty="0">
+                    <a:solidFill>
+                      <a:srgbClr val="333333"/>
+                    </a:solidFill>
+                    <a:latin typeface="Noto Sans Regular"/>
+                  </a:rPr>
+                  <a:t>)</a:t>
+                </a:r>
               </a:p>
             </p:txBody>
           </p:sp>
@@ -32636,10 +31732,10 @@
         <mc:Fallback xmlns="">
           <p:sp>
             <p:nvSpPr>
-              <p:cNvPr id="12" name="Rectangle 11">
+              <p:cNvPr id="3" name="Rectangle 2">
                 <a:extLst>
                   <a:ext uri="{FF2B5EF4-FFF2-40B4-BE49-F238E27FC236}">
-                    <a16:creationId xmlns:a16="http://schemas.microsoft.com/office/drawing/2014/main" id="{73402BCD-3468-4710-97F1-B132D12B2489}"/>
+                    <a16:creationId xmlns:a16="http://schemas.microsoft.com/office/drawing/2014/main" id="{EF571DAB-CAAC-4CB5-B2F3-95D18819EDA3}"/>
                   </a:ext>
                 </a:extLst>
               </p:cNvPr>
@@ -32650,460 +31746,8 @@
             </p:nvSpPr>
             <p:spPr>
               <a:xfrm>
-                <a:off x="1155084" y="5793355"/>
-                <a:ext cx="2610010" cy="468205"/>
-              </a:xfrm>
-              <a:prstGeom prst="rect">
-                <a:avLst/>
-              </a:prstGeom>
-              <a:blipFill>
-                <a:blip r:embed="rId3"/>
-                <a:stretch>
-                  <a:fillRect/>
-                </a:stretch>
-              </a:blipFill>
-            </p:spPr>
-            <p:txBody>
-              <a:bodyPr/>
-              <a:lstStyle/>
-              <a:p>
-                <a:r>
-                  <a:rPr lang="en-CA">
-                    <a:noFill/>
-                  </a:rPr>
-                  <a:t> </a:t>
-                </a:r>
-              </a:p>
-            </p:txBody>
-          </p:sp>
-        </mc:Fallback>
-      </mc:AlternateContent>
-      <mc:AlternateContent xmlns:mc="http://schemas.openxmlformats.org/markup-compatibility/2006" xmlns:a14="http://schemas.microsoft.com/office/drawing/2010/main">
-        <mc:Choice Requires="a14">
-          <p:sp>
-            <p:nvSpPr>
-              <p:cNvPr id="13" name="Rectangle 12">
-                <a:extLst>
-                  <a:ext uri="{FF2B5EF4-FFF2-40B4-BE49-F238E27FC236}">
-                    <a16:creationId xmlns:a16="http://schemas.microsoft.com/office/drawing/2014/main" id="{46EDDAD2-E5D1-497B-AEC3-0AD3F085EE14}"/>
-                  </a:ext>
-                </a:extLst>
-              </p:cNvPr>
-              <p:cNvSpPr/>
-              <p:nvPr/>
-            </p:nvSpPr>
-            <p:spPr>
-              <a:xfrm>
-                <a:off x="5238284" y="5456600"/>
-                <a:ext cx="2924647" cy="1219949"/>
-              </a:xfrm>
-              <a:prstGeom prst="rect">
-                <a:avLst/>
-              </a:prstGeom>
-            </p:spPr>
-            <p:txBody>
-              <a:bodyPr wrap="none">
-                <a:spAutoFit/>
-              </a:bodyPr>
-              <a:lstStyle/>
-              <a:p>
-                <a:pPr/>
-                <a14:m>
-                  <m:oMathPara xmlns:m="http://schemas.openxmlformats.org/officeDocument/2006/math">
-                    <m:oMathParaPr>
-                      <m:jc m:val="centerGroup"/>
-                    </m:oMathParaPr>
-                    <m:oMath xmlns:m="http://schemas.openxmlformats.org/officeDocument/2006/math">
-                      <m:sSup>
-                        <m:sSupPr>
-                          <m:ctrlPr>
-                            <a:rPr lang="en-CA" sz="2400" b="1" i="1" spc="-1" smtClean="0">
-                              <a:solidFill>
-                                <a:srgbClr val="333333"/>
-                              </a:solidFill>
-                              <a:latin typeface="Cambria Math" panose="02040503050406030204" pitchFamily="18" charset="0"/>
-                            </a:rPr>
-                          </m:ctrlPr>
-                        </m:sSupPr>
-                        <m:e>
-                          <m:r>
-                            <a:rPr lang="en-CA" sz="2400" b="1" i="1" spc="-1">
-                              <a:solidFill>
-                                <a:srgbClr val="333333"/>
-                              </a:solidFill>
-                              <a:latin typeface="Cambria Math" panose="02040503050406030204" pitchFamily="18" charset="0"/>
-                            </a:rPr>
-                            <m:t>𝑿</m:t>
-                          </m:r>
-                        </m:e>
-                        <m:sup>
-                          <m:r>
-                            <a:rPr lang="en-CA" sz="2400" b="1" i="1" spc="-1">
-                              <a:solidFill>
-                                <a:srgbClr val="333333"/>
-                              </a:solidFill>
-                              <a:latin typeface="Cambria Math" panose="02040503050406030204" pitchFamily="18" charset="0"/>
-                            </a:rPr>
-                            <m:t>𝑻</m:t>
-                          </m:r>
-                        </m:sup>
-                      </m:sSup>
-                      <m:r>
-                        <a:rPr lang="en-CA" sz="2400" b="1" i="1" spc="-1">
-                          <a:solidFill>
-                            <a:srgbClr val="333333"/>
-                          </a:solidFill>
-                          <a:latin typeface="Cambria Math" panose="02040503050406030204" pitchFamily="18" charset="0"/>
-                        </a:rPr>
-                        <m:t>𝑿</m:t>
-                      </m:r>
-                      <m:r>
-                        <a:rPr lang="en-CA" sz="2400" b="1" i="1" spc="-1" smtClean="0">
-                          <a:solidFill>
-                            <a:srgbClr val="333333"/>
-                          </a:solidFill>
-                          <a:latin typeface="Cambria Math" panose="02040503050406030204" pitchFamily="18" charset="0"/>
-                        </a:rPr>
-                        <m:t>=</m:t>
-                      </m:r>
-                      <m:r>
-                        <a:rPr lang="en-CA" sz="2400" b="1" i="1" spc="-1" smtClean="0">
-                          <a:solidFill>
-                            <a:srgbClr val="333333"/>
-                          </a:solidFill>
-                          <a:latin typeface="Cambria Math" panose="02040503050406030204" pitchFamily="18" charset="0"/>
-                        </a:rPr>
-                        <m:t>𝑽</m:t>
-                      </m:r>
-                      <m:sSup>
-                        <m:sSupPr>
-                          <m:ctrlPr>
-                            <a:rPr lang="en-CA" sz="2400" b="1" i="1" spc="-1" smtClean="0">
-                              <a:solidFill>
-                                <a:srgbClr val="333333"/>
-                              </a:solidFill>
-                              <a:latin typeface="Cambria Math" panose="02040503050406030204" pitchFamily="18" charset="0"/>
-                            </a:rPr>
-                          </m:ctrlPr>
-                        </m:sSupPr>
-                        <m:e>
-                          <m:r>
-                            <a:rPr lang="en-CA" sz="2400" b="1" i="0" spc="-1" smtClean="0">
-                              <a:solidFill>
-                                <a:srgbClr val="333333"/>
-                              </a:solidFill>
-                              <a:latin typeface="Cambria Math" panose="02040503050406030204" pitchFamily="18" charset="0"/>
-                            </a:rPr>
-                            <m:t>𝚺</m:t>
-                          </m:r>
-                        </m:e>
-                        <m:sup>
-                          <m:r>
-                            <a:rPr lang="en-CA" sz="2400" b="1" i="0" spc="-1" smtClean="0">
-                              <a:solidFill>
-                                <a:srgbClr val="333333"/>
-                              </a:solidFill>
-                              <a:latin typeface="Cambria Math" panose="02040503050406030204" pitchFamily="18" charset="0"/>
-                            </a:rPr>
-                            <m:t>𝐓</m:t>
-                          </m:r>
-                        </m:sup>
-                      </m:sSup>
-                      <m:sSup>
-                        <m:sSupPr>
-                          <m:ctrlPr>
-                            <a:rPr lang="en-CA" sz="2400" b="1" i="1" spc="-1" smtClean="0">
-                              <a:solidFill>
-                                <a:srgbClr val="333333"/>
-                              </a:solidFill>
-                              <a:latin typeface="Cambria Math" panose="02040503050406030204" pitchFamily="18" charset="0"/>
-                            </a:rPr>
-                          </m:ctrlPr>
-                        </m:sSupPr>
-                        <m:e>
-                          <m:r>
-                            <a:rPr lang="en-CA" sz="2400" b="1" i="0" spc="-1" smtClean="0">
-                              <a:solidFill>
-                                <a:srgbClr val="333333"/>
-                              </a:solidFill>
-                              <a:latin typeface="Cambria Math" panose="02040503050406030204" pitchFamily="18" charset="0"/>
-                            </a:rPr>
-                            <m:t>𝐔</m:t>
-                          </m:r>
-                        </m:e>
-                        <m:sup>
-                          <m:r>
-                            <a:rPr lang="en-CA" sz="2400" b="1" i="0" spc="-1" smtClean="0">
-                              <a:solidFill>
-                                <a:srgbClr val="333333"/>
-                              </a:solidFill>
-                              <a:latin typeface="Cambria Math" panose="02040503050406030204" pitchFamily="18" charset="0"/>
-                            </a:rPr>
-                            <m:t>𝐓</m:t>
-                          </m:r>
-                        </m:sup>
-                      </m:sSup>
-                      <m:r>
-                        <a:rPr lang="en-CA" sz="2400" b="1" i="0" spc="-1" smtClean="0">
-                          <a:solidFill>
-                            <a:srgbClr val="333333"/>
-                          </a:solidFill>
-                          <a:latin typeface="Cambria Math" panose="02040503050406030204" pitchFamily="18" charset="0"/>
-                        </a:rPr>
-                        <m:t>𝐔</m:t>
-                      </m:r>
-                      <m:r>
-                        <a:rPr lang="en-CA" sz="2400" b="1" i="0" spc="-1" smtClean="0">
-                          <a:solidFill>
-                            <a:srgbClr val="333333"/>
-                          </a:solidFill>
-                          <a:latin typeface="Cambria Math" panose="02040503050406030204" pitchFamily="18" charset="0"/>
-                        </a:rPr>
-                        <m:t>𝚺</m:t>
-                      </m:r>
-                      <m:sSup>
-                        <m:sSupPr>
-                          <m:ctrlPr>
-                            <a:rPr lang="en-CA" sz="2400" b="1" i="1" spc="-1" smtClean="0">
-                              <a:solidFill>
-                                <a:srgbClr val="333333"/>
-                              </a:solidFill>
-                              <a:latin typeface="Cambria Math" panose="02040503050406030204" pitchFamily="18" charset="0"/>
-                            </a:rPr>
-                          </m:ctrlPr>
-                        </m:sSupPr>
-                        <m:e>
-                          <m:r>
-                            <a:rPr lang="en-CA" sz="2400" b="1" i="0" spc="-1" smtClean="0">
-                              <a:solidFill>
-                                <a:srgbClr val="333333"/>
-                              </a:solidFill>
-                              <a:latin typeface="Cambria Math" panose="02040503050406030204" pitchFamily="18" charset="0"/>
-                            </a:rPr>
-                            <m:t>𝐕</m:t>
-                          </m:r>
-                        </m:e>
-                        <m:sup>
-                          <m:r>
-                            <a:rPr lang="en-CA" sz="2400" b="1" i="0" spc="-1" smtClean="0">
-                              <a:solidFill>
-                                <a:srgbClr val="333333"/>
-                              </a:solidFill>
-                              <a:latin typeface="Cambria Math" panose="02040503050406030204" pitchFamily="18" charset="0"/>
-                            </a:rPr>
-                            <m:t>𝐓</m:t>
-                          </m:r>
-                        </m:sup>
-                      </m:sSup>
-                    </m:oMath>
-                  </m:oMathPara>
-                </a14:m>
-                <a:endParaRPr lang="en-CA" sz="2400" dirty="0"/>
-              </a:p>
-              <a:p>
-                <a:pPr/>
-                <a14:m>
-                  <m:oMathPara xmlns:m="http://schemas.openxmlformats.org/officeDocument/2006/math">
-                    <m:oMathParaPr>
-                      <m:jc m:val="centerGroup"/>
-                    </m:oMathParaPr>
-                    <m:oMath xmlns:m="http://schemas.openxmlformats.org/officeDocument/2006/math">
-                      <m:r>
-                        <a:rPr lang="en-CA" sz="2400" b="1" i="1" spc="-1">
-                          <a:solidFill>
-                            <a:srgbClr val="333333"/>
-                          </a:solidFill>
-                          <a:latin typeface="Cambria Math" panose="02040503050406030204" pitchFamily="18" charset="0"/>
-                        </a:rPr>
-                        <m:t>=</m:t>
-                      </m:r>
-                      <m:r>
-                        <a:rPr lang="en-CA" sz="2400" b="1" i="1" spc="-1">
-                          <a:solidFill>
-                            <a:srgbClr val="333333"/>
-                          </a:solidFill>
-                          <a:latin typeface="Cambria Math" panose="02040503050406030204" pitchFamily="18" charset="0"/>
-                        </a:rPr>
-                        <m:t>𝑽</m:t>
-                      </m:r>
-                      <m:sSup>
-                        <m:sSupPr>
-                          <m:ctrlPr>
-                            <a:rPr lang="en-CA" sz="2400" b="1" i="1" spc="-1" smtClean="0">
-                              <a:solidFill>
-                                <a:srgbClr val="333333"/>
-                              </a:solidFill>
-                              <a:latin typeface="Cambria Math" panose="02040503050406030204" pitchFamily="18" charset="0"/>
-                            </a:rPr>
-                          </m:ctrlPr>
-                        </m:sSupPr>
-                        <m:e>
-                          <m:r>
-                            <a:rPr lang="en-CA" sz="2400" b="1" spc="-1">
-                              <a:solidFill>
-                                <a:srgbClr val="333333"/>
-                              </a:solidFill>
-                              <a:latin typeface="Cambria Math" panose="02040503050406030204" pitchFamily="18" charset="0"/>
-                            </a:rPr>
-                            <m:t>𝚺</m:t>
-                          </m:r>
-                        </m:e>
-                        <m:sup>
-                          <m:r>
-                            <a:rPr lang="en-CA" sz="2400" b="1" i="0" spc="-1" smtClean="0">
-                              <a:solidFill>
-                                <a:srgbClr val="333333"/>
-                              </a:solidFill>
-                              <a:latin typeface="Cambria Math" panose="02040503050406030204" pitchFamily="18" charset="0"/>
-                            </a:rPr>
-                            <m:t>𝐓</m:t>
-                          </m:r>
-                        </m:sup>
-                      </m:sSup>
-                      <m:r>
-                        <a:rPr lang="en-CA" sz="2400" b="1" spc="-1">
-                          <a:solidFill>
-                            <a:srgbClr val="333333"/>
-                          </a:solidFill>
-                          <a:latin typeface="Cambria Math" panose="02040503050406030204" pitchFamily="18" charset="0"/>
-                        </a:rPr>
-                        <m:t>𝚺</m:t>
-                      </m:r>
-                      <m:sSup>
-                        <m:sSupPr>
-                          <m:ctrlPr>
-                            <a:rPr lang="en-CA" sz="2400" b="1" i="1" spc="-1">
-                              <a:solidFill>
-                                <a:srgbClr val="333333"/>
-                              </a:solidFill>
-                              <a:latin typeface="Cambria Math" panose="02040503050406030204" pitchFamily="18" charset="0"/>
-                            </a:rPr>
-                          </m:ctrlPr>
-                        </m:sSupPr>
-                        <m:e>
-                          <m:r>
-                            <a:rPr lang="en-CA" sz="2400" b="1" spc="-1">
-                              <a:solidFill>
-                                <a:srgbClr val="333333"/>
-                              </a:solidFill>
-                              <a:latin typeface="Cambria Math" panose="02040503050406030204" pitchFamily="18" charset="0"/>
-                            </a:rPr>
-                            <m:t>𝐕</m:t>
-                          </m:r>
-                        </m:e>
-                        <m:sup>
-                          <m:r>
-                            <a:rPr lang="en-CA" sz="2400" b="1" spc="-1">
-                              <a:solidFill>
-                                <a:srgbClr val="333333"/>
-                              </a:solidFill>
-                              <a:latin typeface="Cambria Math" panose="02040503050406030204" pitchFamily="18" charset="0"/>
-                            </a:rPr>
-                            <m:t>𝐓</m:t>
-                          </m:r>
-                        </m:sup>
-                      </m:sSup>
-                    </m:oMath>
-                  </m:oMathPara>
-                </a14:m>
-                <a:endParaRPr lang="en-CA" sz="2400" dirty="0"/>
-              </a:p>
-              <a:p>
-                <a:pPr/>
-                <a14:m>
-                  <m:oMathPara xmlns:m="http://schemas.openxmlformats.org/officeDocument/2006/math">
-                    <m:oMathParaPr>
-                      <m:jc m:val="centerGroup"/>
-                    </m:oMathParaPr>
-                    <m:oMath xmlns:m="http://schemas.openxmlformats.org/officeDocument/2006/math">
-                      <m:r>
-                        <a:rPr lang="en-CA" sz="2400" b="1" i="1" spc="-1">
-                          <a:solidFill>
-                            <a:srgbClr val="333333"/>
-                          </a:solidFill>
-                          <a:latin typeface="Cambria Math" panose="02040503050406030204" pitchFamily="18" charset="0"/>
-                        </a:rPr>
-                        <m:t>=</m:t>
-                      </m:r>
-                      <m:r>
-                        <a:rPr lang="en-CA" sz="2400" b="1" i="1" spc="-1">
-                          <a:solidFill>
-                            <a:srgbClr val="333333"/>
-                          </a:solidFill>
-                          <a:latin typeface="Cambria Math" panose="02040503050406030204" pitchFamily="18" charset="0"/>
-                        </a:rPr>
-                        <m:t>𝑽</m:t>
-                      </m:r>
-                      <m:r>
-                        <a:rPr lang="en-CA" sz="2400" b="1" i="0" spc="-1" smtClean="0">
-                          <a:solidFill>
-                            <a:srgbClr val="333333"/>
-                          </a:solidFill>
-                          <a:latin typeface="Cambria Math" panose="02040503050406030204" pitchFamily="18" charset="0"/>
-                        </a:rPr>
-                        <m:t>𝚲</m:t>
-                      </m:r>
-                      <m:sSup>
-                        <m:sSupPr>
-                          <m:ctrlPr>
-                            <a:rPr lang="en-CA" sz="2400" b="1" i="1" spc="-1">
-                              <a:solidFill>
-                                <a:srgbClr val="333333"/>
-                              </a:solidFill>
-                              <a:latin typeface="Cambria Math" panose="02040503050406030204" pitchFamily="18" charset="0"/>
-                            </a:rPr>
-                          </m:ctrlPr>
-                        </m:sSupPr>
-                        <m:e>
-                          <m:r>
-                            <a:rPr lang="en-CA" sz="2400" b="1" spc="-1">
-                              <a:solidFill>
-                                <a:srgbClr val="333333"/>
-                              </a:solidFill>
-                              <a:latin typeface="Cambria Math" panose="02040503050406030204" pitchFamily="18" charset="0"/>
-                            </a:rPr>
-                            <m:t>𝐕</m:t>
-                          </m:r>
-                        </m:e>
-                        <m:sup>
-                          <m:r>
-                            <a:rPr lang="en-CA" sz="2400" b="1" spc="-1">
-                              <a:solidFill>
-                                <a:srgbClr val="333333"/>
-                              </a:solidFill>
-                              <a:latin typeface="Cambria Math" panose="02040503050406030204" pitchFamily="18" charset="0"/>
-                            </a:rPr>
-                            <m:t>𝐓</m:t>
-                          </m:r>
-                        </m:sup>
-                      </m:sSup>
-                    </m:oMath>
-                  </m:oMathPara>
-                </a14:m>
-                <a:endParaRPr lang="en-CA" sz="2400" dirty="0"/>
-              </a:p>
-            </p:txBody>
-          </p:sp>
-        </mc:Choice>
-        <mc:Fallback xmlns="">
-          <p:sp>
-            <p:nvSpPr>
-              <p:cNvPr id="13" name="Rectangle 12">
-                <a:extLst>
-                  <a:ext uri="{FF2B5EF4-FFF2-40B4-BE49-F238E27FC236}">
-                    <a16:creationId xmlns:a16="http://schemas.microsoft.com/office/drawing/2014/main" id="{46EDDAD2-E5D1-497B-AEC3-0AD3F085EE14}"/>
-                  </a:ext>
-                </a:extLst>
-              </p:cNvPr>
-              <p:cNvSpPr>
-                <a:spLocks noRot="1" noChangeAspect="1" noMove="1" noResize="1" noEditPoints="1" noAdjustHandles="1" noChangeArrowheads="1" noChangeShapeType="1" noTextEdit="1"/>
-              </p:cNvSpPr>
-              <p:nvPr/>
-            </p:nvSpPr>
-            <p:spPr>
-              <a:xfrm>
-                <a:off x="5238284" y="5456600"/>
-                <a:ext cx="2924647" cy="1219949"/>
+                <a:off x="1909762" y="5140405"/>
+                <a:ext cx="5324475" cy="430887"/>
               </a:xfrm>
               <a:prstGeom prst="rect">
                 <a:avLst/>
@@ -33111,7 +31755,7 @@
               <a:blipFill>
                 <a:blip r:embed="rId4"/>
                 <a:stretch>
-                  <a:fillRect/>
+                  <a:fillRect t="-9859" r="-801" b="-28169"/>
                 </a:stretch>
               </a:blipFill>
             </p:spPr>
@@ -33133,216 +31777,7 @@
     </p:spTree>
     <p:extLst>
       <p:ext uri="{BB962C8B-B14F-4D97-AF65-F5344CB8AC3E}">
-        <p14:creationId xmlns:p14="http://schemas.microsoft.com/office/powerpoint/2010/main" val="2410289357"/>
-      </p:ext>
-    </p:extLst>
-  </p:cSld>
-  <p:clrMapOvr>
-    <a:masterClrMapping/>
-  </p:clrMapOvr>
-</p:sld>
-</file>
-
-<file path=ppt/slides/slide35.xml><?xml version="1.0" encoding="utf-8"?>
-<p:sld xmlns:a="http://schemas.openxmlformats.org/drawingml/2006/main" xmlns:r="http://schemas.openxmlformats.org/officeDocument/2006/relationships" xmlns:p="http://schemas.openxmlformats.org/presentationml/2006/main">
-  <p:cSld>
-    <p:spTree>
-      <p:nvGrpSpPr>
-        <p:cNvPr id="1" name=""/>
-        <p:cNvGrpSpPr/>
-        <p:nvPr/>
-      </p:nvGrpSpPr>
-      <p:grpSpPr>
-        <a:xfrm>
-          <a:off x="0" y="0"/>
-          <a:ext cx="0" cy="0"/>
-          <a:chOff x="0" y="0"/>
-          <a:chExt cx="0" cy="0"/>
-        </a:xfrm>
-      </p:grpSpPr>
-      <p:sp>
-        <p:nvSpPr>
-          <p:cNvPr id="3" name="Content Placeholder 2">
-            <a:extLst>
-              <a:ext uri="{FF2B5EF4-FFF2-40B4-BE49-F238E27FC236}">
-                <a16:creationId xmlns:a16="http://schemas.microsoft.com/office/drawing/2014/main" id="{D0E53CD3-F3AC-4275-825D-99D45DA96AC6}"/>
-              </a:ext>
-            </a:extLst>
-          </p:cNvPr>
-          <p:cNvSpPr>
-            <a:spLocks noGrp="1"/>
-          </p:cNvSpPr>
-          <p:nvPr>
-            <p:ph idx="1"/>
-          </p:nvPr>
-        </p:nvSpPr>
-        <p:spPr>
-          <a:xfrm>
-            <a:off x="402815" y="1847850"/>
-            <a:ext cx="8338369" cy="4351338"/>
-          </a:xfrm>
-        </p:spPr>
-        <p:txBody>
-          <a:bodyPr/>
-          <a:lstStyle/>
-          <a:p>
-            <a:pPr marL="432000" indent="-324000">
-              <a:spcAft>
-                <a:spcPts val="1414"/>
-              </a:spcAft>
-              <a:buClr>
-                <a:srgbClr val="EF2929"/>
-              </a:buClr>
-              <a:buSzPct val="45000"/>
-              <a:buFont typeface="Wingdings" charset="2"/>
-              <a:buChar char=""/>
-            </a:pPr>
-            <a:r>
-              <a:rPr lang="en-CA" spc="-1" dirty="0">
-                <a:solidFill>
-                  <a:srgbClr val="333333"/>
-                </a:solidFill>
-              </a:rPr>
-              <a:t>There is a short exercise involving coordinate transforms and ROS found here:</a:t>
-            </a:r>
-          </a:p>
-          <a:p>
-            <a:pPr marL="108000" indent="0">
-              <a:spcAft>
-                <a:spcPts val="1414"/>
-              </a:spcAft>
-              <a:buClr>
-                <a:srgbClr val="EF2929"/>
-              </a:buClr>
-              <a:buSzPct val="45000"/>
-              <a:buNone/>
-            </a:pPr>
-            <a:r>
-              <a:rPr lang="en-CA" sz="2200" dirty="0">
-                <a:hlinkClick r:id="rId2"/>
-              </a:rPr>
-              <a:t>https://github.com/comp417-fall2019-tutorials/linear_algebra_tutorial</a:t>
-            </a:r>
-            <a:endParaRPr lang="en-CA" sz="2200" dirty="0"/>
-          </a:p>
-          <a:p>
-            <a:pPr marL="450900" indent="-342900">
-              <a:spcAft>
-                <a:spcPts val="1414"/>
-              </a:spcAft>
-              <a:buClr>
-                <a:srgbClr val="EF2929"/>
-              </a:buClr>
-              <a:buSzPct val="100000"/>
-            </a:pPr>
-            <a:r>
-              <a:rPr lang="en-CA" spc="-1" dirty="0">
-                <a:solidFill>
-                  <a:srgbClr val="333333"/>
-                </a:solidFill>
-              </a:rPr>
-              <a:t>See the </a:t>
-            </a:r>
-            <a:r>
-              <a:rPr lang="en-CA" b="1" spc="-1" dirty="0">
-                <a:solidFill>
-                  <a:srgbClr val="333333"/>
-                </a:solidFill>
-              </a:rPr>
-              <a:t>README.md</a:t>
-            </a:r>
-            <a:r>
-              <a:rPr lang="en-CA" spc="-1" dirty="0">
-                <a:solidFill>
-                  <a:srgbClr val="333333"/>
-                </a:solidFill>
-              </a:rPr>
-              <a:t> file for instructions</a:t>
-            </a:r>
-          </a:p>
-          <a:p>
-            <a:endParaRPr lang="en-CA" dirty="0"/>
-          </a:p>
-        </p:txBody>
-      </p:sp>
-      <p:sp>
-        <p:nvSpPr>
-          <p:cNvPr id="4" name="Slide Number Placeholder 3">
-            <a:extLst>
-              <a:ext uri="{FF2B5EF4-FFF2-40B4-BE49-F238E27FC236}">
-                <a16:creationId xmlns:a16="http://schemas.microsoft.com/office/drawing/2014/main" id="{FB3E3B6C-1C72-47F5-997A-E6E6D3F4F972}"/>
-              </a:ext>
-            </a:extLst>
-          </p:cNvPr>
-          <p:cNvSpPr>
-            <a:spLocks noGrp="1"/>
-          </p:cNvSpPr>
-          <p:nvPr>
-            <p:ph type="sldNum" sz="quarter" idx="12"/>
-          </p:nvPr>
-        </p:nvSpPr>
-        <p:spPr/>
-        <p:txBody>
-          <a:bodyPr/>
-          <a:lstStyle/>
-          <a:p>
-            <a:fld id="{8F2D09F1-5447-4EA4-8EA6-0865537200C5}" type="slidenum">
-              <a:rPr lang="en-CA" smtClean="0"/>
-              <a:t>35</a:t>
-            </a:fld>
-            <a:endParaRPr lang="en-CA"/>
-          </a:p>
-        </p:txBody>
-      </p:sp>
-      <p:sp>
-        <p:nvSpPr>
-          <p:cNvPr id="5" name="TextShape 1">
-            <a:extLst>
-              <a:ext uri="{FF2B5EF4-FFF2-40B4-BE49-F238E27FC236}">
-                <a16:creationId xmlns:a16="http://schemas.microsoft.com/office/drawing/2014/main" id="{1CD40EFC-FEF8-4DC3-AB76-3B543CE8CC1D}"/>
-              </a:ext>
-            </a:extLst>
-          </p:cNvPr>
-          <p:cNvSpPr txBox="1">
-            <a:spLocks noGrp="1"/>
-          </p:cNvSpPr>
-          <p:nvPr>
-            <p:ph type="title"/>
-          </p:nvPr>
-        </p:nvSpPr>
-        <p:spPr>
-          <a:xfrm>
-            <a:off x="628650" y="365125"/>
-            <a:ext cx="7886700" cy="1325563"/>
-          </a:xfrm>
-          <a:prstGeom prst="rect">
-            <a:avLst/>
-          </a:prstGeom>
-          <a:noFill/>
-          <a:ln>
-            <a:noFill/>
-          </a:ln>
-        </p:spPr>
-        <p:txBody>
-          <a:bodyPr lIns="0" tIns="0" rIns="0" bIns="0" anchor="ctr"/>
-          <a:lstStyle/>
-          <a:p>
-            <a:r>
-              <a:rPr lang="en-CA" sz="4400" b="1" strike="noStrike" spc="-1" dirty="0">
-                <a:solidFill>
-                  <a:srgbClr val="333333"/>
-                </a:solidFill>
-                <a:latin typeface="Noto Sans Regular"/>
-              </a:rPr>
-              <a:t>Optional ROS Coordinate Frame Exercise</a:t>
-            </a:r>
-          </a:p>
-        </p:txBody>
-      </p:sp>
-    </p:spTree>
-    <p:extLst>
-      <p:ext uri="{BB962C8B-B14F-4D97-AF65-F5344CB8AC3E}">
-        <p14:creationId xmlns:p14="http://schemas.microsoft.com/office/powerpoint/2010/main" val="1010340666"/>
+        <p14:creationId xmlns:p14="http://schemas.microsoft.com/office/powerpoint/2010/main" val="1136207239"/>
       </p:ext>
     </p:extLst>
   </p:cSld>
@@ -36679,8 +35114,8 @@
           </a:p>
         </p:txBody>
       </p:sp>
-      <mc:AlternateContent xmlns:mc="http://schemas.openxmlformats.org/markup-compatibility/2006">
-        <mc:Choice xmlns:a14="http://schemas.microsoft.com/office/drawing/2010/main" Requires="a14">
+      <mc:AlternateContent xmlns:mc="http://schemas.openxmlformats.org/markup-compatibility/2006" xmlns:a14="http://schemas.microsoft.com/office/drawing/2010/main">
+        <mc:Choice Requires="a14">
           <p:sp>
             <p:nvSpPr>
               <p:cNvPr id="3" name="TextBox 2">
@@ -36980,7 +35415,7 @@
             </p:txBody>
           </p:sp>
         </mc:Choice>
-        <mc:Fallback>
+        <mc:Fallback xmlns="">
           <p:sp>
             <p:nvSpPr>
               <p:cNvPr id="3" name="TextBox 2">

</xml_diff>